<commit_message>
To Do in React v1-5 w/ context,useRef and state uplifting working
</commit_message>
<xml_diff>
--- a/ToDo React Project Specifications.pptx
+++ b/ToDo React Project Specifications.pptx
@@ -5,10 +5,10 @@
     <p:sldMasterId id="2147483660" r:id="rId1"/>
   </p:sldMasterIdLst>
   <p:notesMasterIdLst>
-    <p:notesMasterId r:id="rId36"/>
+    <p:notesMasterId r:id="rId37"/>
   </p:notesMasterIdLst>
   <p:handoutMasterIdLst>
-    <p:handoutMasterId r:id="rId37"/>
+    <p:handoutMasterId r:id="rId38"/>
   </p:handoutMasterIdLst>
   <p:sldIdLst>
     <p:sldId id="256" r:id="rId2"/>
@@ -19,32 +19,33 @@
     <p:sldId id="292" r:id="rId7"/>
     <p:sldId id="326" r:id="rId8"/>
     <p:sldId id="308" r:id="rId9"/>
-    <p:sldId id="311" r:id="rId10"/>
-    <p:sldId id="316" r:id="rId11"/>
-    <p:sldId id="317" r:id="rId12"/>
-    <p:sldId id="320" r:id="rId13"/>
-    <p:sldId id="321" r:id="rId14"/>
-    <p:sldId id="322" r:id="rId15"/>
-    <p:sldId id="324" r:id="rId16"/>
-    <p:sldId id="323" r:id="rId17"/>
-    <p:sldId id="304" r:id="rId18"/>
-    <p:sldId id="271" r:id="rId19"/>
-    <p:sldId id="288" r:id="rId20"/>
-    <p:sldId id="289" r:id="rId21"/>
-    <p:sldId id="283" r:id="rId22"/>
-    <p:sldId id="284" r:id="rId23"/>
-    <p:sldId id="291" r:id="rId24"/>
-    <p:sldId id="293" r:id="rId25"/>
-    <p:sldId id="294" r:id="rId26"/>
-    <p:sldId id="295" r:id="rId27"/>
-    <p:sldId id="296" r:id="rId28"/>
-    <p:sldId id="297" r:id="rId29"/>
-    <p:sldId id="298" r:id="rId30"/>
-    <p:sldId id="299" r:id="rId31"/>
-    <p:sldId id="300" r:id="rId32"/>
-    <p:sldId id="301" r:id="rId33"/>
-    <p:sldId id="302" r:id="rId34"/>
-    <p:sldId id="303" r:id="rId35"/>
+    <p:sldId id="327" r:id="rId10"/>
+    <p:sldId id="311" r:id="rId11"/>
+    <p:sldId id="316" r:id="rId12"/>
+    <p:sldId id="317" r:id="rId13"/>
+    <p:sldId id="320" r:id="rId14"/>
+    <p:sldId id="321" r:id="rId15"/>
+    <p:sldId id="322" r:id="rId16"/>
+    <p:sldId id="324" r:id="rId17"/>
+    <p:sldId id="323" r:id="rId18"/>
+    <p:sldId id="304" r:id="rId19"/>
+    <p:sldId id="271" r:id="rId20"/>
+    <p:sldId id="288" r:id="rId21"/>
+    <p:sldId id="289" r:id="rId22"/>
+    <p:sldId id="283" r:id="rId23"/>
+    <p:sldId id="284" r:id="rId24"/>
+    <p:sldId id="291" r:id="rId25"/>
+    <p:sldId id="293" r:id="rId26"/>
+    <p:sldId id="294" r:id="rId27"/>
+    <p:sldId id="295" r:id="rId28"/>
+    <p:sldId id="296" r:id="rId29"/>
+    <p:sldId id="297" r:id="rId30"/>
+    <p:sldId id="298" r:id="rId31"/>
+    <p:sldId id="299" r:id="rId32"/>
+    <p:sldId id="300" r:id="rId33"/>
+    <p:sldId id="301" r:id="rId34"/>
+    <p:sldId id="302" r:id="rId35"/>
+    <p:sldId id="303" r:id="rId36"/>
   </p:sldIdLst>
   <p:sldSz cx="12192000" cy="6858000"/>
   <p:notesSz cx="6858000" cy="9144000"/>
@@ -4177,7 +4178,7 @@
           <a:p>
             <a:fld id="{80680FBE-A8DF-4758-9AC4-3A9E1039168F}" type="datetimeFigureOut">
               <a:rPr lang="en-US" smtClean="0"/>
-              <a:t>3/20/2022</a:t>
+              <a:t>3/21/2022</a:t>
             </a:fld>
             <a:endParaRPr lang="en-US" dirty="0"/>
           </a:p>
@@ -4342,7 +4343,7 @@
           <a:p>
             <a:fld id="{EC13577B-6902-467D-A26C-08A0DD5E4E03}" type="datetimeFigureOut">
               <a:rPr lang="en-US" smtClean="0"/>
-              <a:t>3/20/2022</a:t>
+              <a:t>3/21/2022</a:t>
             </a:fld>
             <a:endParaRPr lang="en-US" dirty="0"/>
           </a:p>
@@ -4772,7 +4773,7 @@
     </p:spTree>
     <p:extLst>
       <p:ext uri="{BB962C8B-B14F-4D97-AF65-F5344CB8AC3E}">
-        <p14:creationId xmlns:p14="http://schemas.microsoft.com/office/powerpoint/2010/main" val="795075515"/>
+        <p14:creationId xmlns:p14="http://schemas.microsoft.com/office/powerpoint/2010/main" val="3897973261"/>
       </p:ext>
     </p:extLst>
   </p:cSld>
@@ -4856,7 +4857,7 @@
     </p:spTree>
     <p:extLst>
       <p:ext uri="{BB962C8B-B14F-4D97-AF65-F5344CB8AC3E}">
-        <p14:creationId xmlns:p14="http://schemas.microsoft.com/office/powerpoint/2010/main" val="735585388"/>
+        <p14:creationId xmlns:p14="http://schemas.microsoft.com/office/powerpoint/2010/main" val="795075515"/>
       </p:ext>
     </p:extLst>
   </p:cSld>
@@ -4940,7 +4941,7 @@
     </p:spTree>
     <p:extLst>
       <p:ext uri="{BB962C8B-B14F-4D97-AF65-F5344CB8AC3E}">
-        <p14:creationId xmlns:p14="http://schemas.microsoft.com/office/powerpoint/2010/main" val="993407"/>
+        <p14:creationId xmlns:p14="http://schemas.microsoft.com/office/powerpoint/2010/main" val="735585388"/>
       </p:ext>
     </p:extLst>
   </p:cSld>
@@ -5024,7 +5025,7 @@
     </p:spTree>
     <p:extLst>
       <p:ext uri="{BB962C8B-B14F-4D97-AF65-F5344CB8AC3E}">
-        <p14:creationId xmlns:p14="http://schemas.microsoft.com/office/powerpoint/2010/main" val="3290913160"/>
+        <p14:creationId xmlns:p14="http://schemas.microsoft.com/office/powerpoint/2010/main" val="993407"/>
       </p:ext>
     </p:extLst>
   </p:cSld>
@@ -5108,7 +5109,7 @@
     </p:spTree>
     <p:extLst>
       <p:ext uri="{BB962C8B-B14F-4D97-AF65-F5344CB8AC3E}">
-        <p14:creationId xmlns:p14="http://schemas.microsoft.com/office/powerpoint/2010/main" val="2181124670"/>
+        <p14:creationId xmlns:p14="http://schemas.microsoft.com/office/powerpoint/2010/main" val="3290913160"/>
       </p:ext>
     </p:extLst>
   </p:cSld>
@@ -5192,7 +5193,7 @@
     </p:spTree>
     <p:extLst>
       <p:ext uri="{BB962C8B-B14F-4D97-AF65-F5344CB8AC3E}">
-        <p14:creationId xmlns:p14="http://schemas.microsoft.com/office/powerpoint/2010/main" val="3948076410"/>
+        <p14:creationId xmlns:p14="http://schemas.microsoft.com/office/powerpoint/2010/main" val="2181124670"/>
       </p:ext>
     </p:extLst>
   </p:cSld>
@@ -5276,6 +5277,90 @@
     </p:spTree>
     <p:extLst>
       <p:ext uri="{BB962C8B-B14F-4D97-AF65-F5344CB8AC3E}">
+        <p14:creationId xmlns:p14="http://schemas.microsoft.com/office/powerpoint/2010/main" val="3948076410"/>
+      </p:ext>
+    </p:extLst>
+  </p:cSld>
+  <p:clrMapOvr>
+    <a:masterClrMapping/>
+  </p:clrMapOvr>
+</p:notes>
+</file>
+
+<file path=ppt/notesSlides/notesSlide17.xml><?xml version="1.0" encoding="utf-8"?>
+<p:notes xmlns:a="http://schemas.openxmlformats.org/drawingml/2006/main" xmlns:r="http://schemas.openxmlformats.org/officeDocument/2006/relationships" xmlns:p="http://schemas.openxmlformats.org/presentationml/2006/main">
+  <p:cSld>
+    <p:spTree>
+      <p:nvGrpSpPr>
+        <p:cNvPr id="1" name=""/>
+        <p:cNvGrpSpPr/>
+        <p:nvPr/>
+      </p:nvGrpSpPr>
+      <p:grpSpPr>
+        <a:xfrm>
+          <a:off x="0" y="0"/>
+          <a:ext cx="0" cy="0"/>
+          <a:chOff x="0" y="0"/>
+          <a:chExt cx="0" cy="0"/>
+        </a:xfrm>
+      </p:grpSpPr>
+      <p:sp>
+        <p:nvSpPr>
+          <p:cNvPr id="2" name="Slide Image Placeholder 1"/>
+          <p:cNvSpPr>
+            <a:spLocks noGrp="1" noRot="1" noChangeAspect="1"/>
+          </p:cNvSpPr>
+          <p:nvPr>
+            <p:ph type="sldImg"/>
+          </p:nvPr>
+        </p:nvSpPr>
+        <p:spPr/>
+      </p:sp>
+      <p:sp>
+        <p:nvSpPr>
+          <p:cNvPr id="3" name="Notes Placeholder 2"/>
+          <p:cNvSpPr>
+            <a:spLocks noGrp="1"/>
+          </p:cNvSpPr>
+          <p:nvPr>
+            <p:ph type="body" idx="1"/>
+          </p:nvPr>
+        </p:nvSpPr>
+        <p:spPr/>
+        <p:txBody>
+          <a:bodyPr/>
+          <a:lstStyle/>
+          <a:p>
+            <a:endParaRPr lang="en-US"/>
+          </a:p>
+        </p:txBody>
+      </p:sp>
+      <p:sp>
+        <p:nvSpPr>
+          <p:cNvPr id="4" name="Slide Number Placeholder 3"/>
+          <p:cNvSpPr>
+            <a:spLocks noGrp="1"/>
+          </p:cNvSpPr>
+          <p:nvPr>
+            <p:ph type="sldNum" sz="quarter" idx="10"/>
+          </p:nvPr>
+        </p:nvSpPr>
+        <p:spPr/>
+        <p:txBody>
+          <a:bodyPr/>
+          <a:lstStyle/>
+          <a:p>
+            <a:fld id="{DF61EA0F-A667-4B49-8422-0062BC55E249}" type="slidenum">
+              <a:rPr lang="en-US" smtClean="0"/>
+              <a:t>18</a:t>
+            </a:fld>
+            <a:endParaRPr lang="en-US" dirty="0"/>
+          </a:p>
+        </p:txBody>
+      </p:sp>
+    </p:spTree>
+    <p:extLst>
+      <p:ext uri="{BB962C8B-B14F-4D97-AF65-F5344CB8AC3E}">
         <p14:creationId xmlns:p14="http://schemas.microsoft.com/office/powerpoint/2010/main" val="3640739715"/>
       </p:ext>
     </p:extLst>
@@ -5286,7 +5371,7 @@
 </p:notes>
 </file>
 
-<file path=ppt/notesSlides/notesSlide17.xml><?xml version="1.0" encoding="utf-8"?>
+<file path=ppt/notesSlides/notesSlide18.xml><?xml version="1.0" encoding="utf-8"?>
 <p:notes xmlns:a="http://schemas.openxmlformats.org/drawingml/2006/main" xmlns:r="http://schemas.openxmlformats.org/officeDocument/2006/relationships" xmlns:p="http://schemas.openxmlformats.org/presentationml/2006/main">
   <p:cSld>
     <p:spTree>
@@ -5356,7 +5441,7 @@
           <a:p>
             <a:fld id="{DF61EA0F-A667-4B49-8422-0062BC55E249}" type="slidenum">
               <a:rPr lang="en-US" smtClean="0"/>
-              <a:t>25</a:t>
+              <a:t>26</a:t>
             </a:fld>
             <a:endParaRPr lang="en-US" dirty="0"/>
           </a:p>
@@ -5375,7 +5460,7 @@
 </p:notes>
 </file>
 
-<file path=ppt/notesSlides/notesSlide18.xml><?xml version="1.0" encoding="utf-8"?>
+<file path=ppt/notesSlides/notesSlide19.xml><?xml version="1.0" encoding="utf-8"?>
 <p:notes xmlns:a="http://schemas.openxmlformats.org/drawingml/2006/main" xmlns:r="http://schemas.openxmlformats.org/officeDocument/2006/relationships" xmlns:p="http://schemas.openxmlformats.org/presentationml/2006/main">
   <p:cSld>
     <p:spTree>
@@ -5440,7 +5525,7 @@
           <a:p>
             <a:fld id="{DF61EA0F-A667-4B49-8422-0062BC55E249}" type="slidenum">
               <a:rPr lang="en-US" smtClean="0"/>
-              <a:t>26</a:t>
+              <a:t>27</a:t>
             </a:fld>
             <a:endParaRPr lang="en-US" dirty="0"/>
           </a:p>
@@ -5450,90 +5535,6 @@
     <p:extLst>
       <p:ext uri="{BB962C8B-B14F-4D97-AF65-F5344CB8AC3E}">
         <p14:creationId xmlns:p14="http://schemas.microsoft.com/office/powerpoint/2010/main" val="1927090591"/>
-      </p:ext>
-    </p:extLst>
-  </p:cSld>
-  <p:clrMapOvr>
-    <a:masterClrMapping/>
-  </p:clrMapOvr>
-</p:notes>
-</file>
-
-<file path=ppt/notesSlides/notesSlide19.xml><?xml version="1.0" encoding="utf-8"?>
-<p:notes xmlns:a="http://schemas.openxmlformats.org/drawingml/2006/main" xmlns:r="http://schemas.openxmlformats.org/officeDocument/2006/relationships" xmlns:p="http://schemas.openxmlformats.org/presentationml/2006/main">
-  <p:cSld>
-    <p:spTree>
-      <p:nvGrpSpPr>
-        <p:cNvPr id="1" name=""/>
-        <p:cNvGrpSpPr/>
-        <p:nvPr/>
-      </p:nvGrpSpPr>
-      <p:grpSpPr>
-        <a:xfrm>
-          <a:off x="0" y="0"/>
-          <a:ext cx="0" cy="0"/>
-          <a:chOff x="0" y="0"/>
-          <a:chExt cx="0" cy="0"/>
-        </a:xfrm>
-      </p:grpSpPr>
-      <p:sp>
-        <p:nvSpPr>
-          <p:cNvPr id="2" name="Slide Image Placeholder 1"/>
-          <p:cNvSpPr>
-            <a:spLocks noGrp="1" noRot="1" noChangeAspect="1"/>
-          </p:cNvSpPr>
-          <p:nvPr>
-            <p:ph type="sldImg"/>
-          </p:nvPr>
-        </p:nvSpPr>
-        <p:spPr/>
-      </p:sp>
-      <p:sp>
-        <p:nvSpPr>
-          <p:cNvPr id="3" name="Notes Placeholder 2"/>
-          <p:cNvSpPr>
-            <a:spLocks noGrp="1"/>
-          </p:cNvSpPr>
-          <p:nvPr>
-            <p:ph type="body" idx="1"/>
-          </p:nvPr>
-        </p:nvSpPr>
-        <p:spPr/>
-        <p:txBody>
-          <a:bodyPr/>
-          <a:lstStyle/>
-          <a:p>
-            <a:endParaRPr lang="en-US"/>
-          </a:p>
-        </p:txBody>
-      </p:sp>
-      <p:sp>
-        <p:nvSpPr>
-          <p:cNvPr id="4" name="Slide Number Placeholder 3"/>
-          <p:cNvSpPr>
-            <a:spLocks noGrp="1"/>
-          </p:cNvSpPr>
-          <p:nvPr>
-            <p:ph type="sldNum" sz="quarter" idx="10"/>
-          </p:nvPr>
-        </p:nvSpPr>
-        <p:spPr/>
-        <p:txBody>
-          <a:bodyPr/>
-          <a:lstStyle/>
-          <a:p>
-            <a:fld id="{DF61EA0F-A667-4B49-8422-0062BC55E249}" type="slidenum">
-              <a:rPr lang="en-US" smtClean="0"/>
-              <a:t>28</a:t>
-            </a:fld>
-            <a:endParaRPr lang="en-US" dirty="0"/>
-          </a:p>
-        </p:txBody>
-      </p:sp>
-    </p:spTree>
-    <p:extLst>
-      <p:ext uri="{BB962C8B-B14F-4D97-AF65-F5344CB8AC3E}">
-        <p14:creationId xmlns:p14="http://schemas.microsoft.com/office/powerpoint/2010/main" val="2283214330"/>
       </p:ext>
     </p:extLst>
   </p:cSld>
@@ -5618,6 +5619,90 @@
     <p:extLst>
       <p:ext uri="{BB962C8B-B14F-4D97-AF65-F5344CB8AC3E}">
         <p14:creationId xmlns:p14="http://schemas.microsoft.com/office/powerpoint/2010/main" val="1927090591"/>
+      </p:ext>
+    </p:extLst>
+  </p:cSld>
+  <p:clrMapOvr>
+    <a:masterClrMapping/>
+  </p:clrMapOvr>
+</p:notes>
+</file>
+
+<file path=ppt/notesSlides/notesSlide20.xml><?xml version="1.0" encoding="utf-8"?>
+<p:notes xmlns:a="http://schemas.openxmlformats.org/drawingml/2006/main" xmlns:r="http://schemas.openxmlformats.org/officeDocument/2006/relationships" xmlns:p="http://schemas.openxmlformats.org/presentationml/2006/main">
+  <p:cSld>
+    <p:spTree>
+      <p:nvGrpSpPr>
+        <p:cNvPr id="1" name=""/>
+        <p:cNvGrpSpPr/>
+        <p:nvPr/>
+      </p:nvGrpSpPr>
+      <p:grpSpPr>
+        <a:xfrm>
+          <a:off x="0" y="0"/>
+          <a:ext cx="0" cy="0"/>
+          <a:chOff x="0" y="0"/>
+          <a:chExt cx="0" cy="0"/>
+        </a:xfrm>
+      </p:grpSpPr>
+      <p:sp>
+        <p:nvSpPr>
+          <p:cNvPr id="2" name="Slide Image Placeholder 1"/>
+          <p:cNvSpPr>
+            <a:spLocks noGrp="1" noRot="1" noChangeAspect="1"/>
+          </p:cNvSpPr>
+          <p:nvPr>
+            <p:ph type="sldImg"/>
+          </p:nvPr>
+        </p:nvSpPr>
+        <p:spPr/>
+      </p:sp>
+      <p:sp>
+        <p:nvSpPr>
+          <p:cNvPr id="3" name="Notes Placeholder 2"/>
+          <p:cNvSpPr>
+            <a:spLocks noGrp="1"/>
+          </p:cNvSpPr>
+          <p:nvPr>
+            <p:ph type="body" idx="1"/>
+          </p:nvPr>
+        </p:nvSpPr>
+        <p:spPr/>
+        <p:txBody>
+          <a:bodyPr/>
+          <a:lstStyle/>
+          <a:p>
+            <a:endParaRPr lang="en-US"/>
+          </a:p>
+        </p:txBody>
+      </p:sp>
+      <p:sp>
+        <p:nvSpPr>
+          <p:cNvPr id="4" name="Slide Number Placeholder 3"/>
+          <p:cNvSpPr>
+            <a:spLocks noGrp="1"/>
+          </p:cNvSpPr>
+          <p:nvPr>
+            <p:ph type="sldNum" sz="quarter" idx="10"/>
+          </p:nvPr>
+        </p:nvSpPr>
+        <p:spPr/>
+        <p:txBody>
+          <a:bodyPr/>
+          <a:lstStyle/>
+          <a:p>
+            <a:fld id="{DF61EA0F-A667-4B49-8422-0062BC55E249}" type="slidenum">
+              <a:rPr lang="en-US" smtClean="0"/>
+              <a:t>29</a:t>
+            </a:fld>
+            <a:endParaRPr lang="en-US" dirty="0"/>
+          </a:p>
+        </p:txBody>
+      </p:sp>
+    </p:spTree>
+    <p:extLst>
+      <p:ext uri="{BB962C8B-B14F-4D97-AF65-F5344CB8AC3E}">
+        <p14:creationId xmlns:p14="http://schemas.microsoft.com/office/powerpoint/2010/main" val="2283214330"/>
       </p:ext>
     </p:extLst>
   </p:cSld>
@@ -6121,7 +6206,7 @@
     </p:spTree>
     <p:extLst>
       <p:ext uri="{BB962C8B-B14F-4D97-AF65-F5344CB8AC3E}">
-        <p14:creationId xmlns:p14="http://schemas.microsoft.com/office/powerpoint/2010/main" val="289028035"/>
+        <p14:creationId xmlns:p14="http://schemas.microsoft.com/office/powerpoint/2010/main" val="1680674009"/>
       </p:ext>
     </p:extLst>
   </p:cSld>
@@ -6205,7 +6290,7 @@
     </p:spTree>
     <p:extLst>
       <p:ext uri="{BB962C8B-B14F-4D97-AF65-F5344CB8AC3E}">
-        <p14:creationId xmlns:p14="http://schemas.microsoft.com/office/powerpoint/2010/main" val="3897973261"/>
+        <p14:creationId xmlns:p14="http://schemas.microsoft.com/office/powerpoint/2010/main" val="289028035"/>
       </p:ext>
     </p:extLst>
   </p:cSld>
@@ -6484,7 +6569,7 @@
           <a:p>
             <a:fld id="{C6BD31A3-BB3E-4313-83C9-61296DA7E415}" type="datetimeFigureOut">
               <a:rPr lang="en-US" smtClean="0"/>
-              <a:t>3/20/2022</a:t>
+              <a:t>3/21/2022</a:t>
             </a:fld>
             <a:endParaRPr lang="en-US"/>
           </a:p>
@@ -6663,7 +6748,7 @@
           <a:p>
             <a:fld id="{C6BD31A3-BB3E-4313-83C9-61296DA7E415}" type="datetimeFigureOut">
               <a:rPr lang="en-US" smtClean="0"/>
-              <a:t>3/20/2022</a:t>
+              <a:t>3/21/2022</a:t>
             </a:fld>
             <a:endParaRPr lang="en-US"/>
           </a:p>
@@ -6941,7 +7026,7 @@
             <a:fld id="{8BEEBAAA-29B5-4AF5-BC5F-7E580C29002D}" type="datetimeFigureOut">
               <a:rPr lang="en-US" smtClean="0"/>
               <a:pPr/>
-              <a:t>3/20/2022</a:t>
+              <a:t>3/21/2022</a:t>
             </a:fld>
             <a:endParaRPr lang="en-US" dirty="0"/>
           </a:p>
@@ -7194,7 +7279,7 @@
           <a:p>
             <a:fld id="{C6BD31A3-BB3E-4313-83C9-61296DA7E415}" type="datetimeFigureOut">
               <a:rPr lang="en-US" smtClean="0"/>
-              <a:t>3/20/2022</a:t>
+              <a:t>3/21/2022</a:t>
             </a:fld>
             <a:endParaRPr lang="en-US"/>
           </a:p>
@@ -7430,7 +7515,7 @@
           <a:p>
             <a:fld id="{C6BD31A3-BB3E-4313-83C9-61296DA7E415}" type="datetimeFigureOut">
               <a:rPr lang="en-US" smtClean="0"/>
-              <a:t>3/20/2022</a:t>
+              <a:t>3/21/2022</a:t>
             </a:fld>
             <a:endParaRPr lang="en-US"/>
           </a:p>
@@ -7767,7 +7852,7 @@
           <a:p>
             <a:fld id="{C6BD31A3-BB3E-4313-83C9-61296DA7E415}" type="datetimeFigureOut">
               <a:rPr lang="en-US" smtClean="0"/>
-              <a:t>3/20/2022</a:t>
+              <a:t>3/21/2022</a:t>
             </a:fld>
             <a:endParaRPr lang="en-US"/>
           </a:p>
@@ -7926,7 +8011,7 @@
             <a:fld id="{8BEEBAAA-29B5-4AF5-BC5F-7E580C29002D}" type="datetimeFigureOut">
               <a:rPr lang="en-US" smtClean="0"/>
               <a:pPr/>
-              <a:t>3/20/2022</a:t>
+              <a:t>3/21/2022</a:t>
             </a:fld>
             <a:endParaRPr lang="en-US" dirty="0"/>
           </a:p>
@@ -8041,7 +8126,7 @@
           <a:p>
             <a:fld id="{C6BD31A3-BB3E-4313-83C9-61296DA7E415}" type="datetimeFigureOut">
               <a:rPr lang="en-US" smtClean="0"/>
-              <a:t>3/20/2022</a:t>
+              <a:t>3/21/2022</a:t>
             </a:fld>
             <a:endParaRPr lang="en-US"/>
           </a:p>
@@ -8318,7 +8403,7 @@
           <a:p>
             <a:fld id="{C6BD31A3-BB3E-4313-83C9-61296DA7E415}" type="datetimeFigureOut">
               <a:rPr lang="en-US" smtClean="0"/>
-              <a:t>3/20/2022</a:t>
+              <a:t>3/21/2022</a:t>
             </a:fld>
             <a:endParaRPr lang="en-US"/>
           </a:p>
@@ -8579,7 +8664,7 @@
           <a:p>
             <a:fld id="{C6BD31A3-BB3E-4313-83C9-61296DA7E415}" type="datetimeFigureOut">
               <a:rPr lang="en-US" smtClean="0"/>
-              <a:t>3/20/2022</a:t>
+              <a:t>3/21/2022</a:t>
             </a:fld>
             <a:endParaRPr lang="en-US"/>
           </a:p>
@@ -8844,7 +8929,7 @@
             <a:fld id="{8BEEBAAA-29B5-4AF5-BC5F-7E580C29002D}" type="datetimeFigureOut">
               <a:rPr lang="en-US" smtClean="0"/>
               <a:pPr/>
-              <a:t>3/20/2022</a:t>
+              <a:t>3/21/2022</a:t>
             </a:fld>
             <a:endParaRPr lang="en-US" dirty="0"/>
           </a:p>
@@ -9530,7 +9615,7 @@
                   <a:latin typeface="Segoe UI Semibold" panose="020B0702040204020203" pitchFamily="34" charset="0"/>
                   <a:cs typeface="Segoe UI Semibold" panose="020B0702040204020203" pitchFamily="34" charset="0"/>
                 </a:rPr>
-                <a:t>4</a:t>
+                <a:t>1</a:t>
               </a:r>
               <a:endParaRPr lang="en-US" sz="1100" b="1" dirty="0">
                 <a:solidFill>
@@ -9587,7 +9672,7 @@
             <a:pPr algn="ctr"/>
             <a:r>
               <a:rPr lang="en-US" sz="1400" dirty="0"/>
-              <a:t>Select scheme name from Dropdown`</a:t>
+              <a:t>User enters new to do item details</a:t>
             </a:r>
           </a:p>
         </p:txBody>
@@ -9636,7 +9721,7 @@
             <a:pPr algn="ctr"/>
             <a:r>
               <a:rPr lang="en-US" sz="1400" dirty="0"/>
-              <a:t>User clicks update button</a:t>
+              <a:t>User clicks Save button</a:t>
             </a:r>
           </a:p>
         </p:txBody>
@@ -9685,7 +9770,511 @@
             <a:pPr algn="ctr"/>
             <a:r>
               <a:rPr lang="en-US" sz="1400" dirty="0"/>
-              <a:t>Program pulls data from JSON</a:t>
+              <a:t>Program saves new entry to state</a:t>
+            </a:r>
+          </a:p>
+        </p:txBody>
+      </p:sp>
+      <p:sp>
+        <p:nvSpPr>
+          <p:cNvPr id="13" name="Rectangle: Rounded Corners 12">
+            <a:extLst>
+              <a:ext uri="{FF2B5EF4-FFF2-40B4-BE49-F238E27FC236}">
+                <a16:creationId xmlns:a16="http://schemas.microsoft.com/office/drawing/2014/main" id="{C376CAC2-8262-4CD3-B15F-8838210F83EB}"/>
+              </a:ext>
+            </a:extLst>
+          </p:cNvPr>
+          <p:cNvSpPr/>
+          <p:nvPr/>
+        </p:nvSpPr>
+        <p:spPr>
+          <a:xfrm>
+            <a:off x="1915886" y="3188529"/>
+            <a:ext cx="3178628" cy="540633"/>
+          </a:xfrm>
+          <a:prstGeom prst="roundRect">
+            <a:avLst/>
+          </a:prstGeom>
+        </p:spPr>
+        <p:style>
+          <a:lnRef idx="2">
+            <a:schemeClr val="accent1">
+              <a:shade val="50000"/>
+            </a:schemeClr>
+          </a:lnRef>
+          <a:fillRef idx="1">
+            <a:schemeClr val="accent1"/>
+          </a:fillRef>
+          <a:effectRef idx="0">
+            <a:schemeClr val="accent1"/>
+          </a:effectRef>
+          <a:fontRef idx="minor">
+            <a:schemeClr val="lt1"/>
+          </a:fontRef>
+        </p:style>
+        <p:txBody>
+          <a:bodyPr rtlCol="0" anchor="ctr"/>
+          <a:lstStyle/>
+          <a:p>
+            <a:pPr algn="ctr"/>
+            <a:r>
+              <a:rPr lang="en-US" sz="1400" dirty="0"/>
+              <a:t>Program renders entire list of </a:t>
+            </a:r>
+            <a:r>
+              <a:rPr lang="en-US" sz="1400" dirty="0" err="1"/>
+              <a:t>todos</a:t>
+            </a:r>
+            <a:r>
+              <a:rPr lang="en-US" sz="1400" dirty="0"/>
+              <a:t> in separate component</a:t>
+            </a:r>
+          </a:p>
+        </p:txBody>
+      </p:sp>
+      <p:cxnSp>
+        <p:nvCxnSpPr>
+          <p:cNvPr id="8" name="Straight Arrow Connector 7">
+            <a:extLst>
+              <a:ext uri="{FF2B5EF4-FFF2-40B4-BE49-F238E27FC236}">
+                <a16:creationId xmlns:a16="http://schemas.microsoft.com/office/drawing/2014/main" id="{A2C08FBD-2DC5-4E58-8D1C-1396669A2CEA}"/>
+              </a:ext>
+            </a:extLst>
+          </p:cNvPr>
+          <p:cNvCxnSpPr>
+            <a:stCxn id="4" idx="2"/>
+            <a:endCxn id="11" idx="0"/>
+          </p:cNvCxnSpPr>
+          <p:nvPr/>
+        </p:nvCxnSpPr>
+        <p:spPr>
+          <a:xfrm>
+            <a:off x="3505200" y="1863634"/>
+            <a:ext cx="0" cy="174539"/>
+          </a:xfrm>
+          <a:prstGeom prst="straightConnector1">
+            <a:avLst/>
+          </a:prstGeom>
+          <a:ln>
+            <a:tailEnd type="triangle"/>
+          </a:ln>
+        </p:spPr>
+        <p:style>
+          <a:lnRef idx="1">
+            <a:schemeClr val="accent1"/>
+          </a:lnRef>
+          <a:fillRef idx="0">
+            <a:schemeClr val="accent1"/>
+          </a:fillRef>
+          <a:effectRef idx="0">
+            <a:schemeClr val="accent1"/>
+          </a:effectRef>
+          <a:fontRef idx="minor">
+            <a:schemeClr val="tx1"/>
+          </a:fontRef>
+        </p:style>
+      </p:cxnSp>
+      <p:cxnSp>
+        <p:nvCxnSpPr>
+          <p:cNvPr id="10" name="Straight Arrow Connector 9">
+            <a:extLst>
+              <a:ext uri="{FF2B5EF4-FFF2-40B4-BE49-F238E27FC236}">
+                <a16:creationId xmlns:a16="http://schemas.microsoft.com/office/drawing/2014/main" id="{A7CCE346-0A10-4542-9C88-4E90F0551EAB}"/>
+              </a:ext>
+            </a:extLst>
+          </p:cNvPr>
+          <p:cNvCxnSpPr>
+            <a:stCxn id="11" idx="2"/>
+            <a:endCxn id="12" idx="0"/>
+          </p:cNvCxnSpPr>
+          <p:nvPr/>
+        </p:nvCxnSpPr>
+        <p:spPr>
+          <a:xfrm>
+            <a:off x="3505200" y="2438812"/>
+            <a:ext cx="0" cy="174539"/>
+          </a:xfrm>
+          <a:prstGeom prst="straightConnector1">
+            <a:avLst/>
+          </a:prstGeom>
+          <a:ln>
+            <a:tailEnd type="triangle"/>
+          </a:ln>
+        </p:spPr>
+        <p:style>
+          <a:lnRef idx="1">
+            <a:schemeClr val="accent1"/>
+          </a:lnRef>
+          <a:fillRef idx="0">
+            <a:schemeClr val="accent1"/>
+          </a:fillRef>
+          <a:effectRef idx="0">
+            <a:schemeClr val="accent1"/>
+          </a:effectRef>
+          <a:fontRef idx="minor">
+            <a:schemeClr val="tx1"/>
+          </a:fontRef>
+        </p:style>
+      </p:cxnSp>
+      <p:cxnSp>
+        <p:nvCxnSpPr>
+          <p:cNvPr id="17" name="Straight Arrow Connector 16">
+            <a:extLst>
+              <a:ext uri="{FF2B5EF4-FFF2-40B4-BE49-F238E27FC236}">
+                <a16:creationId xmlns:a16="http://schemas.microsoft.com/office/drawing/2014/main" id="{56E360A9-EBF1-459F-8323-DE4CBBCD41F5}"/>
+              </a:ext>
+            </a:extLst>
+          </p:cNvPr>
+          <p:cNvCxnSpPr>
+            <a:cxnSpLocks/>
+            <a:stCxn id="12" idx="2"/>
+            <a:endCxn id="13" idx="0"/>
+          </p:cNvCxnSpPr>
+          <p:nvPr/>
+        </p:nvCxnSpPr>
+        <p:spPr>
+          <a:xfrm>
+            <a:off x="3505200" y="3013990"/>
+            <a:ext cx="0" cy="174539"/>
+          </a:xfrm>
+          <a:prstGeom prst="straightConnector1">
+            <a:avLst/>
+          </a:prstGeom>
+          <a:ln>
+            <a:tailEnd type="triangle"/>
+          </a:ln>
+        </p:spPr>
+        <p:style>
+          <a:lnRef idx="1">
+            <a:schemeClr val="accent1"/>
+          </a:lnRef>
+          <a:fillRef idx="0">
+            <a:schemeClr val="accent1"/>
+          </a:fillRef>
+          <a:effectRef idx="0">
+            <a:schemeClr val="accent1"/>
+          </a:effectRef>
+          <a:fontRef idx="minor">
+            <a:schemeClr val="tx1"/>
+          </a:fontRef>
+        </p:style>
+      </p:cxnSp>
+    </p:spTree>
+    <p:extLst>
+      <p:ext uri="{BB962C8B-B14F-4D97-AF65-F5344CB8AC3E}">
+        <p14:creationId xmlns:p14="http://schemas.microsoft.com/office/powerpoint/2010/main" val="2160610087"/>
+      </p:ext>
+    </p:extLst>
+  </p:cSld>
+  <p:clrMapOvr>
+    <a:masterClrMapping/>
+  </p:clrMapOvr>
+</p:sld>
+</file>
+
+<file path=ppt/slides/slide11.xml><?xml version="1.0" encoding="utf-8"?>
+<p:sld xmlns:a="http://schemas.openxmlformats.org/drawingml/2006/main" xmlns:r="http://schemas.openxmlformats.org/officeDocument/2006/relationships" xmlns:p="http://schemas.openxmlformats.org/presentationml/2006/main">
+  <p:cSld>
+    <p:spTree>
+      <p:nvGrpSpPr>
+        <p:cNvPr id="1" name=""/>
+        <p:cNvGrpSpPr/>
+        <p:nvPr/>
+      </p:nvGrpSpPr>
+      <p:grpSpPr>
+        <a:xfrm>
+          <a:off x="0" y="0"/>
+          <a:ext cx="0" cy="0"/>
+          <a:chOff x="0" y="0"/>
+          <a:chExt cx="0" cy="0"/>
+        </a:xfrm>
+      </p:grpSpPr>
+      <p:sp>
+        <p:nvSpPr>
+          <p:cNvPr id="2" name="Title 1"/>
+          <p:cNvSpPr>
+            <a:spLocks noGrp="1"/>
+          </p:cNvSpPr>
+          <p:nvPr>
+            <p:ph type="title"/>
+          </p:nvPr>
+        </p:nvSpPr>
+        <p:spPr>
+          <a:xfrm>
+            <a:off x="521208" y="448056"/>
+            <a:ext cx="11309348" cy="640080"/>
+          </a:xfrm>
+        </p:spPr>
+        <p:txBody>
+          <a:bodyPr/>
+          <a:lstStyle/>
+          <a:p>
+            <a:r>
+              <a:rPr lang="en-US" dirty="0"/>
+              <a:t>Project Execution – High Level</a:t>
+            </a:r>
+          </a:p>
+        </p:txBody>
+      </p:sp>
+      <p:grpSp>
+        <p:nvGrpSpPr>
+          <p:cNvPr id="31" name="Group 30" descr="Step number 1"/>
+          <p:cNvGrpSpPr/>
+          <p:nvPr/>
+        </p:nvGrpSpPr>
+        <p:grpSpPr bwMode="gray">
+          <a:xfrm>
+            <a:off x="1086365" y="1445992"/>
+            <a:ext cx="380382" cy="296049"/>
+            <a:chOff x="6741828" y="1435344"/>
+            <a:chExt cx="380382" cy="296049"/>
+          </a:xfrm>
+        </p:grpSpPr>
+        <p:sp>
+          <p:nvSpPr>
+            <p:cNvPr id="32" name="Rectangle 31" descr="Step number 1"/>
+            <p:cNvSpPr/>
+            <p:nvPr/>
+          </p:nvSpPr>
+          <p:spPr bwMode="gray">
+            <a:xfrm>
+              <a:off x="6793669" y="1452347"/>
+              <a:ext cx="279292" cy="279046"/>
+            </a:xfrm>
+            <a:prstGeom prst="rect">
+              <a:avLst/>
+            </a:prstGeom>
+            <a:solidFill>
+              <a:schemeClr val="accent2">
+                <a:lumMod val="75000"/>
+              </a:schemeClr>
+            </a:solidFill>
+            <a:ln>
+              <a:noFill/>
+            </a:ln>
+          </p:spPr>
+          <p:style>
+            <a:lnRef idx="2">
+              <a:schemeClr val="accent1">
+                <a:shade val="50000"/>
+              </a:schemeClr>
+            </a:lnRef>
+            <a:fillRef idx="1">
+              <a:schemeClr val="accent1"/>
+            </a:fillRef>
+            <a:effectRef idx="0">
+              <a:schemeClr val="accent1"/>
+            </a:effectRef>
+            <a:fontRef idx="minor">
+              <a:schemeClr val="lt1"/>
+            </a:fontRef>
+          </p:style>
+          <p:txBody>
+            <a:bodyPr rtlCol="0" anchor="ctr"/>
+            <a:lstStyle/>
+            <a:p>
+              <a:pPr algn="ctr"/>
+              <a:endParaRPr lang="en-US"/>
+            </a:p>
+          </p:txBody>
+        </p:sp>
+        <p:sp>
+          <p:nvSpPr>
+            <p:cNvPr id="33" name="TextBox 32" descr="Small square with numeral 1 inside "/>
+            <p:cNvSpPr txBox="1"/>
+            <p:nvPr/>
+          </p:nvSpPr>
+          <p:spPr bwMode="gray">
+            <a:xfrm>
+              <a:off x="6741828" y="1435344"/>
+              <a:ext cx="380382" cy="276999"/>
+            </a:xfrm>
+            <a:prstGeom prst="rect">
+              <a:avLst/>
+            </a:prstGeom>
+            <a:noFill/>
+          </p:spPr>
+          <p:txBody>
+            <a:bodyPr wrap="square" rtlCol="0">
+              <a:spAutoFit/>
+            </a:bodyPr>
+            <a:lstStyle/>
+            <a:p>
+              <a:pPr algn="ctr"/>
+              <a:r>
+                <a:rPr lang="en-US" sz="1200" b="1" dirty="0">
+                  <a:solidFill>
+                    <a:schemeClr val="bg1"/>
+                  </a:solidFill>
+                  <a:latin typeface="Segoe UI Semibold" panose="020B0702040204020203" pitchFamily="34" charset="0"/>
+                  <a:cs typeface="Segoe UI Semibold" panose="020B0702040204020203" pitchFamily="34" charset="0"/>
+                </a:rPr>
+                <a:t>4</a:t>
+              </a:r>
+              <a:endParaRPr lang="en-US" sz="1100" b="1" dirty="0">
+                <a:solidFill>
+                  <a:schemeClr val="bg1"/>
+                </a:solidFill>
+                <a:latin typeface="Segoe UI Semibold" panose="020B0702040204020203" pitchFamily="34" charset="0"/>
+                <a:cs typeface="Segoe UI Semibold" panose="020B0702040204020203" pitchFamily="34" charset="0"/>
+              </a:endParaRPr>
+            </a:p>
+          </p:txBody>
+        </p:sp>
+      </p:grpSp>
+      <p:sp>
+        <p:nvSpPr>
+          <p:cNvPr id="4" name="Rectangle: Rounded Corners 3">
+            <a:extLst>
+              <a:ext uri="{FF2B5EF4-FFF2-40B4-BE49-F238E27FC236}">
+                <a16:creationId xmlns:a16="http://schemas.microsoft.com/office/drawing/2014/main" id="{0587C6C6-24E9-4114-BAEF-B97D27A588E1}"/>
+              </a:ext>
+            </a:extLst>
+          </p:cNvPr>
+          <p:cNvSpPr/>
+          <p:nvPr/>
+        </p:nvSpPr>
+        <p:spPr>
+          <a:xfrm>
+            <a:off x="1915886" y="1462995"/>
+            <a:ext cx="3178628" cy="400639"/>
+          </a:xfrm>
+          <a:prstGeom prst="roundRect">
+            <a:avLst/>
+          </a:prstGeom>
+        </p:spPr>
+        <p:style>
+          <a:lnRef idx="2">
+            <a:schemeClr val="accent1">
+              <a:shade val="50000"/>
+            </a:schemeClr>
+          </a:lnRef>
+          <a:fillRef idx="1">
+            <a:schemeClr val="accent1"/>
+          </a:fillRef>
+          <a:effectRef idx="0">
+            <a:schemeClr val="accent1"/>
+          </a:effectRef>
+          <a:fontRef idx="minor">
+            <a:schemeClr val="lt1"/>
+          </a:fontRef>
+        </p:style>
+        <p:txBody>
+          <a:bodyPr rtlCol="0" anchor="ctr"/>
+          <a:lstStyle/>
+          <a:p>
+            <a:pPr algn="ctr"/>
+            <a:r>
+              <a:rPr lang="en-US" sz="1400" dirty="0"/>
+              <a:t>User decides to change status of </a:t>
+            </a:r>
+            <a:r>
+              <a:rPr lang="en-US" sz="1400" dirty="0" err="1"/>
+              <a:t>todo</a:t>
+            </a:r>
+            <a:endParaRPr lang="en-US" sz="1400" dirty="0"/>
+          </a:p>
+        </p:txBody>
+      </p:sp>
+      <p:sp>
+        <p:nvSpPr>
+          <p:cNvPr id="11" name="Rectangle: Rounded Corners 10">
+            <a:extLst>
+              <a:ext uri="{FF2B5EF4-FFF2-40B4-BE49-F238E27FC236}">
+                <a16:creationId xmlns:a16="http://schemas.microsoft.com/office/drawing/2014/main" id="{33CE17BD-9864-485E-8F43-99E10AF52DD2}"/>
+              </a:ext>
+            </a:extLst>
+          </p:cNvPr>
+          <p:cNvSpPr/>
+          <p:nvPr/>
+        </p:nvSpPr>
+        <p:spPr>
+          <a:xfrm>
+            <a:off x="1915886" y="2038173"/>
+            <a:ext cx="3178628" cy="400639"/>
+          </a:xfrm>
+          <a:prstGeom prst="roundRect">
+            <a:avLst/>
+          </a:prstGeom>
+        </p:spPr>
+        <p:style>
+          <a:lnRef idx="2">
+            <a:schemeClr val="accent1">
+              <a:shade val="50000"/>
+            </a:schemeClr>
+          </a:lnRef>
+          <a:fillRef idx="1">
+            <a:schemeClr val="accent1"/>
+          </a:fillRef>
+          <a:effectRef idx="0">
+            <a:schemeClr val="accent1"/>
+          </a:effectRef>
+          <a:fontRef idx="minor">
+            <a:schemeClr val="lt1"/>
+          </a:fontRef>
+        </p:style>
+        <p:txBody>
+          <a:bodyPr rtlCol="0" anchor="ctr"/>
+          <a:lstStyle/>
+          <a:p>
+            <a:pPr algn="ctr"/>
+            <a:r>
+              <a:rPr lang="en-US" sz="1400" dirty="0"/>
+              <a:t>User clicks Completed link in </a:t>
+            </a:r>
+            <a:r>
+              <a:rPr lang="en-US" sz="1400" dirty="0" err="1"/>
+              <a:t>todo</a:t>
+            </a:r>
+            <a:endParaRPr lang="en-US" sz="1400" dirty="0"/>
+          </a:p>
+        </p:txBody>
+      </p:sp>
+      <p:sp>
+        <p:nvSpPr>
+          <p:cNvPr id="12" name="Rectangle: Rounded Corners 11">
+            <a:extLst>
+              <a:ext uri="{FF2B5EF4-FFF2-40B4-BE49-F238E27FC236}">
+                <a16:creationId xmlns:a16="http://schemas.microsoft.com/office/drawing/2014/main" id="{B2049D71-0E6F-449D-8ECD-B94D8B8A04D1}"/>
+              </a:ext>
+            </a:extLst>
+          </p:cNvPr>
+          <p:cNvSpPr/>
+          <p:nvPr/>
+        </p:nvSpPr>
+        <p:spPr>
+          <a:xfrm>
+            <a:off x="1915886" y="2613351"/>
+            <a:ext cx="3178628" cy="400639"/>
+          </a:xfrm>
+          <a:prstGeom prst="roundRect">
+            <a:avLst/>
+          </a:prstGeom>
+        </p:spPr>
+        <p:style>
+          <a:lnRef idx="2">
+            <a:schemeClr val="accent1">
+              <a:shade val="50000"/>
+            </a:schemeClr>
+          </a:lnRef>
+          <a:fillRef idx="1">
+            <a:schemeClr val="accent1"/>
+          </a:fillRef>
+          <a:effectRef idx="0">
+            <a:schemeClr val="accent1"/>
+          </a:effectRef>
+          <a:fontRef idx="minor">
+            <a:schemeClr val="lt1"/>
+          </a:fontRef>
+        </p:style>
+        <p:txBody>
+          <a:bodyPr rtlCol="0" anchor="ctr"/>
+          <a:lstStyle/>
+          <a:p>
+            <a:pPr algn="ctr"/>
+            <a:r>
+              <a:rPr lang="en-US" sz="1400" dirty="0"/>
+              <a:t>Program passes value up to main component</a:t>
             </a:r>
           </a:p>
         </p:txBody>
@@ -9734,8 +10323,13 @@
             <a:pPr algn="ctr"/>
             <a:r>
               <a:rPr lang="en-US" sz="1400" dirty="0"/>
-              <a:t>Program filters data based on selected scheme</a:t>
-            </a:r>
+              <a:t>Program updates state for specific </a:t>
+            </a:r>
+            <a:r>
+              <a:rPr lang="en-US" sz="1400" dirty="0" err="1"/>
+              <a:t>todo</a:t>
+            </a:r>
+            <a:endParaRPr lang="en-US" sz="1400" dirty="0"/>
           </a:p>
         </p:txBody>
       </p:sp>
@@ -9783,7 +10377,15 @@
             <a:pPr algn="ctr"/>
             <a:r>
               <a:rPr lang="en-US" sz="1400" dirty="0"/>
-              <a:t>Program displays data &amp; totals</a:t>
+              <a:t>Program renders list of </a:t>
+            </a:r>
+            <a:r>
+              <a:rPr lang="en-US" sz="1400" dirty="0" err="1"/>
+              <a:t>todos</a:t>
+            </a:r>
+            <a:r>
+              <a:rPr lang="en-US" sz="1400" dirty="0"/>
+              <a:t> in separate component</a:t>
             </a:r>
           </a:p>
         </p:txBody>
@@ -9956,194 +10558,6 @@
           </a:fontRef>
         </p:style>
       </p:cxnSp>
-      <p:sp>
-        <p:nvSpPr>
-          <p:cNvPr id="15" name="Rectangle: Rounded Corners 14">
-            <a:extLst>
-              <a:ext uri="{FF2B5EF4-FFF2-40B4-BE49-F238E27FC236}">
-                <a16:creationId xmlns:a16="http://schemas.microsoft.com/office/drawing/2014/main" id="{3C015335-FCD7-4844-BAA7-5072F83884C6}"/>
-              </a:ext>
-            </a:extLst>
-          </p:cNvPr>
-          <p:cNvSpPr/>
-          <p:nvPr/>
-        </p:nvSpPr>
-        <p:spPr>
-          <a:xfrm>
-            <a:off x="5325291" y="2038173"/>
-            <a:ext cx="3178628" cy="400639"/>
-          </a:xfrm>
-          <a:prstGeom prst="roundRect">
-            <a:avLst/>
-          </a:prstGeom>
-          <a:solidFill>
-            <a:srgbClr val="002060"/>
-          </a:solidFill>
-        </p:spPr>
-        <p:style>
-          <a:lnRef idx="2">
-            <a:schemeClr val="accent1">
-              <a:shade val="50000"/>
-            </a:schemeClr>
-          </a:lnRef>
-          <a:fillRef idx="1">
-            <a:schemeClr val="accent1"/>
-          </a:fillRef>
-          <a:effectRef idx="0">
-            <a:schemeClr val="accent1"/>
-          </a:effectRef>
-          <a:fontRef idx="minor">
-            <a:schemeClr val="lt1"/>
-          </a:fontRef>
-        </p:style>
-        <p:txBody>
-          <a:bodyPr rtlCol="0" anchor="ctr"/>
-          <a:lstStyle/>
-          <a:p>
-            <a:pPr algn="ctr"/>
-            <a:r>
-              <a:rPr lang="en-US" sz="1400" dirty="0"/>
-              <a:t>User clicks clear/reset</a:t>
-            </a:r>
-          </a:p>
-        </p:txBody>
-      </p:sp>
-      <p:sp>
-        <p:nvSpPr>
-          <p:cNvPr id="16" name="Rectangle: Rounded Corners 15">
-            <a:extLst>
-              <a:ext uri="{FF2B5EF4-FFF2-40B4-BE49-F238E27FC236}">
-                <a16:creationId xmlns:a16="http://schemas.microsoft.com/office/drawing/2014/main" id="{62C3CAB2-55FF-4083-AAD9-F10A1AB5DA2B}"/>
-              </a:ext>
-            </a:extLst>
-          </p:cNvPr>
-          <p:cNvSpPr/>
-          <p:nvPr/>
-        </p:nvSpPr>
-        <p:spPr>
-          <a:xfrm>
-            <a:off x="5325291" y="3188528"/>
-            <a:ext cx="3178628" cy="400639"/>
-          </a:xfrm>
-          <a:prstGeom prst="roundRect">
-            <a:avLst/>
-          </a:prstGeom>
-          <a:solidFill>
-            <a:srgbClr val="002060"/>
-          </a:solidFill>
-        </p:spPr>
-        <p:style>
-          <a:lnRef idx="2">
-            <a:schemeClr val="accent1">
-              <a:shade val="50000"/>
-            </a:schemeClr>
-          </a:lnRef>
-          <a:fillRef idx="1">
-            <a:schemeClr val="accent1"/>
-          </a:fillRef>
-          <a:effectRef idx="0">
-            <a:schemeClr val="accent1"/>
-          </a:effectRef>
-          <a:fontRef idx="minor">
-            <a:schemeClr val="lt1"/>
-          </a:fontRef>
-        </p:style>
-        <p:txBody>
-          <a:bodyPr rtlCol="0" anchor="ctr"/>
-          <a:lstStyle/>
-          <a:p>
-            <a:pPr algn="ctr"/>
-            <a:r>
-              <a:rPr lang="en-US" sz="1400" dirty="0"/>
-              <a:t>Program wipes data from all tables and variables</a:t>
-            </a:r>
-          </a:p>
-        </p:txBody>
-      </p:sp>
-      <p:cxnSp>
-        <p:nvCxnSpPr>
-          <p:cNvPr id="5" name="Straight Arrow Connector 4">
-            <a:extLst>
-              <a:ext uri="{FF2B5EF4-FFF2-40B4-BE49-F238E27FC236}">
-                <a16:creationId xmlns:a16="http://schemas.microsoft.com/office/drawing/2014/main" id="{CE972011-181B-4485-9883-C8E44BDBA954}"/>
-              </a:ext>
-            </a:extLst>
-          </p:cNvPr>
-          <p:cNvCxnSpPr>
-            <a:stCxn id="15" idx="2"/>
-            <a:endCxn id="16" idx="0"/>
-          </p:cNvCxnSpPr>
-          <p:nvPr/>
-        </p:nvCxnSpPr>
-        <p:spPr>
-          <a:xfrm>
-            <a:off x="6914605" y="2438812"/>
-            <a:ext cx="0" cy="749716"/>
-          </a:xfrm>
-          <a:prstGeom prst="straightConnector1">
-            <a:avLst/>
-          </a:prstGeom>
-          <a:ln>
-            <a:tailEnd type="triangle"/>
-          </a:ln>
-        </p:spPr>
-        <p:style>
-          <a:lnRef idx="1">
-            <a:schemeClr val="accent1"/>
-          </a:lnRef>
-          <a:fillRef idx="0">
-            <a:schemeClr val="accent1"/>
-          </a:fillRef>
-          <a:effectRef idx="0">
-            <a:schemeClr val="accent1"/>
-          </a:effectRef>
-          <a:fontRef idx="minor">
-            <a:schemeClr val="tx1"/>
-          </a:fontRef>
-        </p:style>
-      </p:cxnSp>
-      <p:cxnSp>
-        <p:nvCxnSpPr>
-          <p:cNvPr id="7" name="Straight Arrow Connector 6">
-            <a:extLst>
-              <a:ext uri="{FF2B5EF4-FFF2-40B4-BE49-F238E27FC236}">
-                <a16:creationId xmlns:a16="http://schemas.microsoft.com/office/drawing/2014/main" id="{4AC5F4E2-67E4-45D2-80BE-84FE6EBA3E6B}"/>
-              </a:ext>
-            </a:extLst>
-          </p:cNvPr>
-          <p:cNvCxnSpPr>
-            <a:stCxn id="16" idx="2"/>
-            <a:endCxn id="14" idx="3"/>
-          </p:cNvCxnSpPr>
-          <p:nvPr/>
-        </p:nvCxnSpPr>
-        <p:spPr>
-          <a:xfrm flipH="1">
-            <a:off x="5094514" y="3589167"/>
-            <a:ext cx="1820091" cy="374860"/>
-          </a:xfrm>
-          <a:prstGeom prst="straightConnector1">
-            <a:avLst/>
-          </a:prstGeom>
-          <a:ln>
-            <a:tailEnd type="triangle"/>
-          </a:ln>
-        </p:spPr>
-        <p:style>
-          <a:lnRef idx="1">
-            <a:schemeClr val="accent1"/>
-          </a:lnRef>
-          <a:fillRef idx="0">
-            <a:schemeClr val="accent1"/>
-          </a:fillRef>
-          <a:effectRef idx="0">
-            <a:schemeClr val="accent1"/>
-          </a:effectRef>
-          <a:fontRef idx="minor">
-            <a:schemeClr val="tx1"/>
-          </a:fontRef>
-        </p:style>
-      </p:cxnSp>
     </p:spTree>
     <p:extLst>
       <p:ext uri="{BB962C8B-B14F-4D97-AF65-F5344CB8AC3E}">
@@ -10157,7 +10571,7 @@
 </p:sld>
 </file>
 
-<file path=ppt/slides/slide11.xml><?xml version="1.0" encoding="utf-8"?>
+<file path=ppt/slides/slide12.xml><?xml version="1.0" encoding="utf-8"?>
 <p:sld xmlns:a="http://schemas.openxmlformats.org/drawingml/2006/main" xmlns:r="http://schemas.openxmlformats.org/officeDocument/2006/relationships" xmlns:p="http://schemas.openxmlformats.org/presentationml/2006/main">
   <p:cSld>
     <p:spTree>
@@ -11104,7 +11518,7 @@
 </p:sld>
 </file>
 
-<file path=ppt/slides/slide12.xml><?xml version="1.0" encoding="utf-8"?>
+<file path=ppt/slides/slide13.xml><?xml version="1.0" encoding="utf-8"?>
 <p:sld xmlns:a="http://schemas.openxmlformats.org/drawingml/2006/main" xmlns:r="http://schemas.openxmlformats.org/officeDocument/2006/relationships" xmlns:p="http://schemas.openxmlformats.org/presentationml/2006/main">
   <p:cSld>
     <p:spTree>
@@ -12197,7 +12611,7 @@
 </p:sld>
 </file>
 
-<file path=ppt/slides/slide13.xml><?xml version="1.0" encoding="utf-8"?>
+<file path=ppt/slides/slide14.xml><?xml version="1.0" encoding="utf-8"?>
 <p:sld xmlns:a="http://schemas.openxmlformats.org/drawingml/2006/main" xmlns:r="http://schemas.openxmlformats.org/officeDocument/2006/relationships" xmlns:p="http://schemas.openxmlformats.org/presentationml/2006/main">
   <p:cSld>
     <p:spTree>
@@ -13571,7 +13985,7 @@
 </p:sld>
 </file>
 
-<file path=ppt/slides/slide14.xml><?xml version="1.0" encoding="utf-8"?>
+<file path=ppt/slides/slide15.xml><?xml version="1.0" encoding="utf-8"?>
 <p:sld xmlns:a="http://schemas.openxmlformats.org/drawingml/2006/main" xmlns:r="http://schemas.openxmlformats.org/officeDocument/2006/relationships" xmlns:p="http://schemas.openxmlformats.org/presentationml/2006/main">
   <p:cSld>
     <p:spTree>
@@ -15380,7 +15794,7 @@
 </p:sld>
 </file>
 
-<file path=ppt/slides/slide15.xml><?xml version="1.0" encoding="utf-8"?>
+<file path=ppt/slides/slide16.xml><?xml version="1.0" encoding="utf-8"?>
 <p:sld xmlns:a="http://schemas.openxmlformats.org/drawingml/2006/main" xmlns:r="http://schemas.openxmlformats.org/officeDocument/2006/relationships" xmlns:p="http://schemas.openxmlformats.org/presentationml/2006/main">
   <p:cSld>
     <p:spTree>
@@ -17140,7 +17554,7 @@
 </p:sld>
 </file>
 
-<file path=ppt/slides/slide16.xml><?xml version="1.0" encoding="utf-8"?>
+<file path=ppt/slides/slide17.xml><?xml version="1.0" encoding="utf-8"?>
 <p:sld xmlns:a="http://schemas.openxmlformats.org/drawingml/2006/main" xmlns:r="http://schemas.openxmlformats.org/officeDocument/2006/relationships" xmlns:p="http://schemas.openxmlformats.org/presentationml/2006/main">
   <p:cSld>
     <p:spTree>
@@ -17197,7 +17611,7 @@
 </p:sld>
 </file>
 
-<file path=ppt/slides/slide17.xml><?xml version="1.0" encoding="utf-8"?>
+<file path=ppt/slides/slide18.xml><?xml version="1.0" encoding="utf-8"?>
 <p:sld xmlns:a="http://schemas.openxmlformats.org/drawingml/2006/main" xmlns:r="http://schemas.openxmlformats.org/officeDocument/2006/relationships" xmlns:p="http://schemas.openxmlformats.org/presentationml/2006/main">
   <p:cSld>
     <p:spTree>
@@ -17698,7 +18112,7 @@
 </p:sld>
 </file>
 
-<file path=ppt/slides/slide18.xml><?xml version="1.0" encoding="utf-8"?>
+<file path=ppt/slides/slide19.xml><?xml version="1.0" encoding="utf-8"?>
 <p:sld xmlns:a="http://schemas.openxmlformats.org/drawingml/2006/main" xmlns:r="http://schemas.openxmlformats.org/officeDocument/2006/relationships" xmlns:p="http://schemas.openxmlformats.org/presentationml/2006/main">
   <p:cSld>
     <p:spTree>
@@ -18823,7 +19237,452 @@
 </p:sld>
 </file>
 
-<file path=ppt/slides/slide19.xml><?xml version="1.0" encoding="utf-8"?>
+<file path=ppt/slides/slide2.xml><?xml version="1.0" encoding="utf-8"?>
+<p:sld xmlns:a="http://schemas.openxmlformats.org/drawingml/2006/main" xmlns:r="http://schemas.openxmlformats.org/officeDocument/2006/relationships" xmlns:p="http://schemas.openxmlformats.org/presentationml/2006/main">
+  <p:cSld>
+    <p:spTree>
+      <p:nvGrpSpPr>
+        <p:cNvPr id="1" name=""/>
+        <p:cNvGrpSpPr/>
+        <p:nvPr/>
+      </p:nvGrpSpPr>
+      <p:grpSpPr>
+        <a:xfrm>
+          <a:off x="0" y="0"/>
+          <a:ext cx="0" cy="0"/>
+          <a:chOff x="0" y="0"/>
+          <a:chExt cx="0" cy="0"/>
+        </a:xfrm>
+      </p:grpSpPr>
+      <p:sp>
+        <p:nvSpPr>
+          <p:cNvPr id="3" name="Title 2"/>
+          <p:cNvSpPr>
+            <a:spLocks noGrp="1"/>
+          </p:cNvSpPr>
+          <p:nvPr>
+            <p:ph type="title"/>
+          </p:nvPr>
+        </p:nvSpPr>
+        <p:spPr>
+          <a:xfrm>
+            <a:off x="521208" y="448056"/>
+            <a:ext cx="11309348" cy="640080"/>
+          </a:xfrm>
+        </p:spPr>
+        <p:txBody>
+          <a:bodyPr>
+            <a:normAutofit/>
+          </a:bodyPr>
+          <a:lstStyle/>
+          <a:p>
+            <a:r>
+              <a:rPr lang="en-US" dirty="0"/>
+              <a:t>Version Control</a:t>
+            </a:r>
+          </a:p>
+        </p:txBody>
+      </p:sp>
+      <p:graphicFrame>
+        <p:nvGraphicFramePr>
+          <p:cNvPr id="4" name="Table 4">
+            <a:extLst>
+              <a:ext uri="{FF2B5EF4-FFF2-40B4-BE49-F238E27FC236}">
+                <a16:creationId xmlns:a16="http://schemas.microsoft.com/office/drawing/2014/main" id="{7A6106FA-9F84-4F13-9D71-C97387025403}"/>
+              </a:ext>
+            </a:extLst>
+          </p:cNvPr>
+          <p:cNvGraphicFramePr>
+            <a:graphicFrameLocks noGrp="1"/>
+          </p:cNvGraphicFramePr>
+          <p:nvPr>
+            <p:extLst>
+              <p:ext uri="{D42A27DB-BD31-4B8C-83A1-F6EECF244321}">
+                <p14:modId xmlns:p14="http://schemas.microsoft.com/office/powerpoint/2010/main" val="7747966"/>
+              </p:ext>
+            </p:extLst>
+          </p:nvPr>
+        </p:nvGraphicFramePr>
+        <p:xfrm>
+          <a:off x="2032000" y="1530699"/>
+          <a:ext cx="9798556" cy="2595880"/>
+        </p:xfrm>
+        <a:graphic>
+          <a:graphicData uri="http://schemas.openxmlformats.org/drawingml/2006/table">
+            <a:tbl>
+              <a:tblPr firstRow="1" bandRow="1">
+                <a:tableStyleId>{0E3FDE45-AF77-4B5C-9715-49D594BDF05E}</a:tableStyleId>
+              </a:tblPr>
+              <a:tblGrid>
+                <a:gridCol w="2256863">
+                  <a:extLst>
+                    <a:ext uri="{9D8B030D-6E8A-4147-A177-3AD203B41FA5}">
+                      <a16:colId xmlns:a16="http://schemas.microsoft.com/office/drawing/2014/main" val="1290608621"/>
+                    </a:ext>
+                  </a:extLst>
+                </a:gridCol>
+                <a:gridCol w="4275508">
+                  <a:extLst>
+                    <a:ext uri="{9D8B030D-6E8A-4147-A177-3AD203B41FA5}">
+                      <a16:colId xmlns:a16="http://schemas.microsoft.com/office/drawing/2014/main" val="2762738862"/>
+                    </a:ext>
+                  </a:extLst>
+                </a:gridCol>
+                <a:gridCol w="3266185">
+                  <a:extLst>
+                    <a:ext uri="{9D8B030D-6E8A-4147-A177-3AD203B41FA5}">
+                      <a16:colId xmlns:a16="http://schemas.microsoft.com/office/drawing/2014/main" val="590071325"/>
+                    </a:ext>
+                  </a:extLst>
+                </a:gridCol>
+              </a:tblGrid>
+              <a:tr h="370840">
+                <a:tc>
+                  <a:txBody>
+                    <a:bodyPr/>
+                    <a:lstStyle/>
+                    <a:p>
+                      <a:r>
+                        <a:rPr lang="en-IN" dirty="0"/>
+                        <a:t>Date</a:t>
+                      </a:r>
+                    </a:p>
+                  </a:txBody>
+                  <a:tcPr/>
+                </a:tc>
+                <a:tc>
+                  <a:txBody>
+                    <a:bodyPr/>
+                    <a:lstStyle/>
+                    <a:p>
+                      <a:r>
+                        <a:rPr lang="en-IN" dirty="0"/>
+                        <a:t>Update</a:t>
+                      </a:r>
+                    </a:p>
+                  </a:txBody>
+                  <a:tcPr/>
+                </a:tc>
+                <a:tc>
+                  <a:txBody>
+                    <a:bodyPr/>
+                    <a:lstStyle/>
+                    <a:p>
+                      <a:r>
+                        <a:rPr lang="en-IN" dirty="0"/>
+                        <a:t>Test results</a:t>
+                      </a:r>
+                    </a:p>
+                  </a:txBody>
+                  <a:tcPr/>
+                </a:tc>
+                <a:extLst>
+                  <a:ext uri="{0D108BD9-81ED-4DB2-BD59-A6C34878D82A}">
+                    <a16:rowId xmlns:a16="http://schemas.microsoft.com/office/drawing/2014/main" val="3471197533"/>
+                  </a:ext>
+                </a:extLst>
+              </a:tr>
+              <a:tr h="370840">
+                <a:tc>
+                  <a:txBody>
+                    <a:bodyPr/>
+                    <a:lstStyle/>
+                    <a:p>
+                      <a:r>
+                        <a:rPr lang="en-IN" dirty="0"/>
+                        <a:t>07-04-2021</a:t>
+                      </a:r>
+                    </a:p>
+                  </a:txBody>
+                  <a:tcPr/>
+                </a:tc>
+                <a:tc>
+                  <a:txBody>
+                    <a:bodyPr/>
+                    <a:lstStyle/>
+                    <a:p>
+                      <a:r>
+                        <a:rPr lang="en-IN" dirty="0"/>
+                        <a:t>Template V1 released</a:t>
+                      </a:r>
+                    </a:p>
+                  </a:txBody>
+                  <a:tcPr/>
+                </a:tc>
+                <a:tc>
+                  <a:txBody>
+                    <a:bodyPr/>
+                    <a:lstStyle/>
+                    <a:p>
+                      <a:r>
+                        <a:rPr lang="en-IN" dirty="0"/>
+                        <a:t>Successfully working</a:t>
+                      </a:r>
+                    </a:p>
+                  </a:txBody>
+                  <a:tcPr/>
+                </a:tc>
+                <a:extLst>
+                  <a:ext uri="{0D108BD9-81ED-4DB2-BD59-A6C34878D82A}">
+                    <a16:rowId xmlns:a16="http://schemas.microsoft.com/office/drawing/2014/main" val="3203524079"/>
+                  </a:ext>
+                </a:extLst>
+              </a:tr>
+              <a:tr h="370840">
+                <a:tc>
+                  <a:txBody>
+                    <a:bodyPr/>
+                    <a:lstStyle/>
+                    <a:p>
+                      <a:r>
+                        <a:rPr lang="en-IN" dirty="0"/>
+                        <a:t>20-03-2022</a:t>
+                      </a:r>
+                    </a:p>
+                  </a:txBody>
+                  <a:tcPr/>
+                </a:tc>
+                <a:tc>
+                  <a:txBody>
+                    <a:bodyPr/>
+                    <a:lstStyle/>
+                    <a:p>
+                      <a:r>
+                        <a:rPr lang="en-IN" dirty="0"/>
+                        <a:t>Baseline creation</a:t>
+                      </a:r>
+                    </a:p>
+                  </a:txBody>
+                  <a:tcPr/>
+                </a:tc>
+                <a:tc>
+                  <a:txBody>
+                    <a:bodyPr/>
+                    <a:lstStyle/>
+                    <a:p>
+                      <a:pPr marL="0" marR="0" lvl="0" indent="0" algn="l" defTabSz="914400" rtl="0" eaLnBrk="1" fontAlgn="auto" latinLnBrk="0" hangingPunct="1">
+                        <a:lnSpc>
+                          <a:spcPct val="100000"/>
+                        </a:lnSpc>
+                        <a:spcBef>
+                          <a:spcPts val="0"/>
+                        </a:spcBef>
+                        <a:spcAft>
+                          <a:spcPts val="0"/>
+                        </a:spcAft>
+                        <a:buClrTx/>
+                        <a:buSzTx/>
+                        <a:buFontTx/>
+                        <a:buNone/>
+                        <a:tabLst/>
+                        <a:defRPr/>
+                      </a:pPr>
+                      <a:r>
+                        <a:rPr lang="en-IN" dirty="0"/>
+                        <a:t>Successfully working</a:t>
+                      </a:r>
+                    </a:p>
+                  </a:txBody>
+                  <a:tcPr/>
+                </a:tc>
+                <a:extLst>
+                  <a:ext uri="{0D108BD9-81ED-4DB2-BD59-A6C34878D82A}">
+                    <a16:rowId xmlns:a16="http://schemas.microsoft.com/office/drawing/2014/main" val="3628704807"/>
+                  </a:ext>
+                </a:extLst>
+              </a:tr>
+              <a:tr h="370840">
+                <a:tc>
+                  <a:txBody>
+                    <a:bodyPr/>
+                    <a:lstStyle/>
+                    <a:p>
+                      <a:r>
+                        <a:rPr lang="en-IN" dirty="0"/>
+                        <a:t>21-03-2022</a:t>
+                      </a:r>
+                    </a:p>
+                  </a:txBody>
+                  <a:tcPr/>
+                </a:tc>
+                <a:tc>
+                  <a:txBody>
+                    <a:bodyPr/>
+                    <a:lstStyle/>
+                    <a:p>
+                      <a:r>
+                        <a:rPr lang="en-IN" dirty="0"/>
+                        <a:t>Event handlers and state uplifting </a:t>
+                      </a:r>
+                    </a:p>
+                  </a:txBody>
+                  <a:tcPr/>
+                </a:tc>
+                <a:tc>
+                  <a:txBody>
+                    <a:bodyPr/>
+                    <a:lstStyle/>
+                    <a:p>
+                      <a:pPr marL="0" marR="0" lvl="0" indent="0" algn="l" defTabSz="914400" rtl="0" eaLnBrk="1" fontAlgn="auto" latinLnBrk="0" hangingPunct="1">
+                        <a:lnSpc>
+                          <a:spcPct val="100000"/>
+                        </a:lnSpc>
+                        <a:spcBef>
+                          <a:spcPts val="0"/>
+                        </a:spcBef>
+                        <a:spcAft>
+                          <a:spcPts val="0"/>
+                        </a:spcAft>
+                        <a:buClrTx/>
+                        <a:buSzTx/>
+                        <a:buFontTx/>
+                        <a:buNone/>
+                        <a:tabLst/>
+                        <a:defRPr/>
+                      </a:pPr>
+                      <a:r>
+                        <a:rPr lang="en-IN"/>
+                        <a:t>Successfully working</a:t>
+                      </a:r>
+                    </a:p>
+                  </a:txBody>
+                  <a:tcPr/>
+                </a:tc>
+                <a:extLst>
+                  <a:ext uri="{0D108BD9-81ED-4DB2-BD59-A6C34878D82A}">
+                    <a16:rowId xmlns:a16="http://schemas.microsoft.com/office/drawing/2014/main" val="4066410010"/>
+                  </a:ext>
+                </a:extLst>
+              </a:tr>
+              <a:tr h="370840">
+                <a:tc>
+                  <a:txBody>
+                    <a:bodyPr/>
+                    <a:lstStyle/>
+                    <a:p>
+                      <a:endParaRPr lang="en-IN"/>
+                    </a:p>
+                  </a:txBody>
+                  <a:tcPr/>
+                </a:tc>
+                <a:tc>
+                  <a:txBody>
+                    <a:bodyPr/>
+                    <a:lstStyle/>
+                    <a:p>
+                      <a:endParaRPr lang="en-IN"/>
+                    </a:p>
+                  </a:txBody>
+                  <a:tcPr/>
+                </a:tc>
+                <a:tc>
+                  <a:txBody>
+                    <a:bodyPr/>
+                    <a:lstStyle/>
+                    <a:p>
+                      <a:endParaRPr lang="en-IN"/>
+                    </a:p>
+                  </a:txBody>
+                  <a:tcPr/>
+                </a:tc>
+                <a:extLst>
+                  <a:ext uri="{0D108BD9-81ED-4DB2-BD59-A6C34878D82A}">
+                    <a16:rowId xmlns:a16="http://schemas.microsoft.com/office/drawing/2014/main" val="2969357130"/>
+                  </a:ext>
+                </a:extLst>
+              </a:tr>
+              <a:tr h="370840">
+                <a:tc>
+                  <a:txBody>
+                    <a:bodyPr/>
+                    <a:lstStyle/>
+                    <a:p>
+                      <a:endParaRPr lang="en-IN"/>
+                    </a:p>
+                  </a:txBody>
+                  <a:tcPr/>
+                </a:tc>
+                <a:tc>
+                  <a:txBody>
+                    <a:bodyPr/>
+                    <a:lstStyle/>
+                    <a:p>
+                      <a:endParaRPr lang="en-IN"/>
+                    </a:p>
+                  </a:txBody>
+                  <a:tcPr/>
+                </a:tc>
+                <a:tc>
+                  <a:txBody>
+                    <a:bodyPr/>
+                    <a:lstStyle/>
+                    <a:p>
+                      <a:endParaRPr lang="en-IN"/>
+                    </a:p>
+                  </a:txBody>
+                  <a:tcPr/>
+                </a:tc>
+                <a:extLst>
+                  <a:ext uri="{0D108BD9-81ED-4DB2-BD59-A6C34878D82A}">
+                    <a16:rowId xmlns:a16="http://schemas.microsoft.com/office/drawing/2014/main" val="2133395301"/>
+                  </a:ext>
+                </a:extLst>
+              </a:tr>
+              <a:tr h="370840">
+                <a:tc>
+                  <a:txBody>
+                    <a:bodyPr/>
+                    <a:lstStyle/>
+                    <a:p>
+                      <a:endParaRPr lang="en-IN"/>
+                    </a:p>
+                  </a:txBody>
+                  <a:tcPr/>
+                </a:tc>
+                <a:tc>
+                  <a:txBody>
+                    <a:bodyPr/>
+                    <a:lstStyle/>
+                    <a:p>
+                      <a:endParaRPr lang="en-IN"/>
+                    </a:p>
+                  </a:txBody>
+                  <a:tcPr/>
+                </a:tc>
+                <a:tc>
+                  <a:txBody>
+                    <a:bodyPr/>
+                    <a:lstStyle/>
+                    <a:p>
+                      <a:endParaRPr lang="en-IN" dirty="0"/>
+                    </a:p>
+                  </a:txBody>
+                  <a:tcPr/>
+                </a:tc>
+                <a:extLst>
+                  <a:ext uri="{0D108BD9-81ED-4DB2-BD59-A6C34878D82A}">
+                    <a16:rowId xmlns:a16="http://schemas.microsoft.com/office/drawing/2014/main" val="2477663498"/>
+                  </a:ext>
+                </a:extLst>
+              </a:tr>
+            </a:tbl>
+          </a:graphicData>
+        </a:graphic>
+      </p:graphicFrame>
+    </p:spTree>
+    <p:extLst>
+      <p:ext uri="{BB962C8B-B14F-4D97-AF65-F5344CB8AC3E}">
+        <p14:creationId xmlns:p14="http://schemas.microsoft.com/office/powerpoint/2010/main" val="3871821239"/>
+      </p:ext>
+    </p:extLst>
+  </p:cSld>
+  <p:clrMapOvr>
+    <a:masterClrMapping/>
+  </p:clrMapOvr>
+</p:sld>
+</file>
+
+<file path=ppt/slides/slide20.xml><?xml version="1.0" encoding="utf-8"?>
 <p:sld xmlns:a="http://schemas.openxmlformats.org/drawingml/2006/main" xmlns:r="http://schemas.openxmlformats.org/officeDocument/2006/relationships" xmlns:p="http://schemas.openxmlformats.org/presentationml/2006/main">
   <p:cSld>
     <p:spTree>
@@ -20586,426 +21445,7 @@
 </p:sld>
 </file>
 
-<file path=ppt/slides/slide2.xml><?xml version="1.0" encoding="utf-8"?>
-<p:sld xmlns:a="http://schemas.openxmlformats.org/drawingml/2006/main" xmlns:r="http://schemas.openxmlformats.org/officeDocument/2006/relationships" xmlns:p="http://schemas.openxmlformats.org/presentationml/2006/main">
-  <p:cSld>
-    <p:spTree>
-      <p:nvGrpSpPr>
-        <p:cNvPr id="1" name=""/>
-        <p:cNvGrpSpPr/>
-        <p:nvPr/>
-      </p:nvGrpSpPr>
-      <p:grpSpPr>
-        <a:xfrm>
-          <a:off x="0" y="0"/>
-          <a:ext cx="0" cy="0"/>
-          <a:chOff x="0" y="0"/>
-          <a:chExt cx="0" cy="0"/>
-        </a:xfrm>
-      </p:grpSpPr>
-      <p:sp>
-        <p:nvSpPr>
-          <p:cNvPr id="3" name="Title 2"/>
-          <p:cNvSpPr>
-            <a:spLocks noGrp="1"/>
-          </p:cNvSpPr>
-          <p:nvPr>
-            <p:ph type="title"/>
-          </p:nvPr>
-        </p:nvSpPr>
-        <p:spPr>
-          <a:xfrm>
-            <a:off x="521208" y="448056"/>
-            <a:ext cx="11309348" cy="640080"/>
-          </a:xfrm>
-        </p:spPr>
-        <p:txBody>
-          <a:bodyPr>
-            <a:normAutofit/>
-          </a:bodyPr>
-          <a:lstStyle/>
-          <a:p>
-            <a:r>
-              <a:rPr lang="en-US" dirty="0"/>
-              <a:t>Version Control</a:t>
-            </a:r>
-          </a:p>
-        </p:txBody>
-      </p:sp>
-      <p:graphicFrame>
-        <p:nvGraphicFramePr>
-          <p:cNvPr id="4" name="Table 4">
-            <a:extLst>
-              <a:ext uri="{FF2B5EF4-FFF2-40B4-BE49-F238E27FC236}">
-                <a16:creationId xmlns:a16="http://schemas.microsoft.com/office/drawing/2014/main" id="{7A6106FA-9F84-4F13-9D71-C97387025403}"/>
-              </a:ext>
-            </a:extLst>
-          </p:cNvPr>
-          <p:cNvGraphicFramePr>
-            <a:graphicFrameLocks noGrp="1"/>
-          </p:cNvGraphicFramePr>
-          <p:nvPr>
-            <p:extLst>
-              <p:ext uri="{D42A27DB-BD31-4B8C-83A1-F6EECF244321}">
-                <p14:modId xmlns:p14="http://schemas.microsoft.com/office/powerpoint/2010/main" val="2448287964"/>
-              </p:ext>
-            </p:extLst>
-          </p:nvPr>
-        </p:nvGraphicFramePr>
-        <p:xfrm>
-          <a:off x="2032000" y="1530699"/>
-          <a:ext cx="9798556" cy="2595880"/>
-        </p:xfrm>
-        <a:graphic>
-          <a:graphicData uri="http://schemas.openxmlformats.org/drawingml/2006/table">
-            <a:tbl>
-              <a:tblPr firstRow="1" bandRow="1">
-                <a:tableStyleId>{0E3FDE45-AF77-4B5C-9715-49D594BDF05E}</a:tableStyleId>
-              </a:tblPr>
-              <a:tblGrid>
-                <a:gridCol w="2256863">
-                  <a:extLst>
-                    <a:ext uri="{9D8B030D-6E8A-4147-A177-3AD203B41FA5}">
-                      <a16:colId xmlns:a16="http://schemas.microsoft.com/office/drawing/2014/main" val="1290608621"/>
-                    </a:ext>
-                  </a:extLst>
-                </a:gridCol>
-                <a:gridCol w="4275508">
-                  <a:extLst>
-                    <a:ext uri="{9D8B030D-6E8A-4147-A177-3AD203B41FA5}">
-                      <a16:colId xmlns:a16="http://schemas.microsoft.com/office/drawing/2014/main" val="2762738862"/>
-                    </a:ext>
-                  </a:extLst>
-                </a:gridCol>
-                <a:gridCol w="3266185">
-                  <a:extLst>
-                    <a:ext uri="{9D8B030D-6E8A-4147-A177-3AD203B41FA5}">
-                      <a16:colId xmlns:a16="http://schemas.microsoft.com/office/drawing/2014/main" val="590071325"/>
-                    </a:ext>
-                  </a:extLst>
-                </a:gridCol>
-              </a:tblGrid>
-              <a:tr h="370840">
-                <a:tc>
-                  <a:txBody>
-                    <a:bodyPr/>
-                    <a:lstStyle/>
-                    <a:p>
-                      <a:r>
-                        <a:rPr lang="en-IN" dirty="0"/>
-                        <a:t>Date</a:t>
-                      </a:r>
-                    </a:p>
-                  </a:txBody>
-                  <a:tcPr/>
-                </a:tc>
-                <a:tc>
-                  <a:txBody>
-                    <a:bodyPr/>
-                    <a:lstStyle/>
-                    <a:p>
-                      <a:r>
-                        <a:rPr lang="en-IN" dirty="0"/>
-                        <a:t>Update</a:t>
-                      </a:r>
-                    </a:p>
-                  </a:txBody>
-                  <a:tcPr/>
-                </a:tc>
-                <a:tc>
-                  <a:txBody>
-                    <a:bodyPr/>
-                    <a:lstStyle/>
-                    <a:p>
-                      <a:r>
-                        <a:rPr lang="en-IN" dirty="0"/>
-                        <a:t>Test results</a:t>
-                      </a:r>
-                    </a:p>
-                  </a:txBody>
-                  <a:tcPr/>
-                </a:tc>
-                <a:extLst>
-                  <a:ext uri="{0D108BD9-81ED-4DB2-BD59-A6C34878D82A}">
-                    <a16:rowId xmlns:a16="http://schemas.microsoft.com/office/drawing/2014/main" val="3471197533"/>
-                  </a:ext>
-                </a:extLst>
-              </a:tr>
-              <a:tr h="370840">
-                <a:tc>
-                  <a:txBody>
-                    <a:bodyPr/>
-                    <a:lstStyle/>
-                    <a:p>
-                      <a:r>
-                        <a:rPr lang="en-IN" dirty="0"/>
-                        <a:t>07-04-2021</a:t>
-                      </a:r>
-                    </a:p>
-                  </a:txBody>
-                  <a:tcPr/>
-                </a:tc>
-                <a:tc>
-                  <a:txBody>
-                    <a:bodyPr/>
-                    <a:lstStyle/>
-                    <a:p>
-                      <a:r>
-                        <a:rPr lang="en-IN" dirty="0"/>
-                        <a:t>Template V1 released</a:t>
-                      </a:r>
-                    </a:p>
-                  </a:txBody>
-                  <a:tcPr/>
-                </a:tc>
-                <a:tc>
-                  <a:txBody>
-                    <a:bodyPr/>
-                    <a:lstStyle/>
-                    <a:p>
-                      <a:r>
-                        <a:rPr lang="en-IN" dirty="0"/>
-                        <a:t>Successfully working</a:t>
-                      </a:r>
-                    </a:p>
-                  </a:txBody>
-                  <a:tcPr/>
-                </a:tc>
-                <a:extLst>
-                  <a:ext uri="{0D108BD9-81ED-4DB2-BD59-A6C34878D82A}">
-                    <a16:rowId xmlns:a16="http://schemas.microsoft.com/office/drawing/2014/main" val="3203524079"/>
-                  </a:ext>
-                </a:extLst>
-              </a:tr>
-              <a:tr h="370840">
-                <a:tc>
-                  <a:txBody>
-                    <a:bodyPr/>
-                    <a:lstStyle/>
-                    <a:p>
-                      <a:r>
-                        <a:rPr lang="en-IN" dirty="0"/>
-                        <a:t>20-03-2022</a:t>
-                      </a:r>
-                    </a:p>
-                  </a:txBody>
-                  <a:tcPr/>
-                </a:tc>
-                <a:tc>
-                  <a:txBody>
-                    <a:bodyPr/>
-                    <a:lstStyle/>
-                    <a:p>
-                      <a:r>
-                        <a:rPr lang="en-IN" dirty="0"/>
-                        <a:t>Baseline creation</a:t>
-                      </a:r>
-                    </a:p>
-                  </a:txBody>
-                  <a:tcPr/>
-                </a:tc>
-                <a:tc>
-                  <a:txBody>
-                    <a:bodyPr/>
-                    <a:lstStyle/>
-                    <a:p>
-                      <a:pPr marL="0" marR="0" lvl="0" indent="0" algn="l" defTabSz="914400" rtl="0" eaLnBrk="1" fontAlgn="auto" latinLnBrk="0" hangingPunct="1">
-                        <a:lnSpc>
-                          <a:spcPct val="100000"/>
-                        </a:lnSpc>
-                        <a:spcBef>
-                          <a:spcPts val="0"/>
-                        </a:spcBef>
-                        <a:spcAft>
-                          <a:spcPts val="0"/>
-                        </a:spcAft>
-                        <a:buClrTx/>
-                        <a:buSzTx/>
-                        <a:buFontTx/>
-                        <a:buNone/>
-                        <a:tabLst/>
-                        <a:defRPr/>
-                      </a:pPr>
-                      <a:r>
-                        <a:rPr lang="en-IN" dirty="0"/>
-                        <a:t>WIP</a:t>
-                      </a:r>
-                    </a:p>
-                  </a:txBody>
-                  <a:tcPr/>
-                </a:tc>
-                <a:extLst>
-                  <a:ext uri="{0D108BD9-81ED-4DB2-BD59-A6C34878D82A}">
-                    <a16:rowId xmlns:a16="http://schemas.microsoft.com/office/drawing/2014/main" val="3628704807"/>
-                  </a:ext>
-                </a:extLst>
-              </a:tr>
-              <a:tr h="370840">
-                <a:tc>
-                  <a:txBody>
-                    <a:bodyPr/>
-                    <a:lstStyle/>
-                    <a:p>
-                      <a:endParaRPr lang="en-IN"/>
-                    </a:p>
-                  </a:txBody>
-                  <a:tcPr/>
-                </a:tc>
-                <a:tc>
-                  <a:txBody>
-                    <a:bodyPr/>
-                    <a:lstStyle/>
-                    <a:p>
-                      <a:endParaRPr lang="en-IN"/>
-                    </a:p>
-                  </a:txBody>
-                  <a:tcPr/>
-                </a:tc>
-                <a:tc>
-                  <a:txBody>
-                    <a:bodyPr/>
-                    <a:lstStyle/>
-                    <a:p>
-                      <a:endParaRPr lang="en-IN"/>
-                    </a:p>
-                  </a:txBody>
-                  <a:tcPr/>
-                </a:tc>
-                <a:extLst>
-                  <a:ext uri="{0D108BD9-81ED-4DB2-BD59-A6C34878D82A}">
-                    <a16:rowId xmlns:a16="http://schemas.microsoft.com/office/drawing/2014/main" val="4066410010"/>
-                  </a:ext>
-                </a:extLst>
-              </a:tr>
-              <a:tr h="370840">
-                <a:tc>
-                  <a:txBody>
-                    <a:bodyPr/>
-                    <a:lstStyle/>
-                    <a:p>
-                      <a:endParaRPr lang="en-IN"/>
-                    </a:p>
-                  </a:txBody>
-                  <a:tcPr/>
-                </a:tc>
-                <a:tc>
-                  <a:txBody>
-                    <a:bodyPr/>
-                    <a:lstStyle/>
-                    <a:p>
-                      <a:endParaRPr lang="en-IN"/>
-                    </a:p>
-                  </a:txBody>
-                  <a:tcPr/>
-                </a:tc>
-                <a:tc>
-                  <a:txBody>
-                    <a:bodyPr/>
-                    <a:lstStyle/>
-                    <a:p>
-                      <a:endParaRPr lang="en-IN"/>
-                    </a:p>
-                  </a:txBody>
-                  <a:tcPr/>
-                </a:tc>
-                <a:extLst>
-                  <a:ext uri="{0D108BD9-81ED-4DB2-BD59-A6C34878D82A}">
-                    <a16:rowId xmlns:a16="http://schemas.microsoft.com/office/drawing/2014/main" val="2969357130"/>
-                  </a:ext>
-                </a:extLst>
-              </a:tr>
-              <a:tr h="370840">
-                <a:tc>
-                  <a:txBody>
-                    <a:bodyPr/>
-                    <a:lstStyle/>
-                    <a:p>
-                      <a:endParaRPr lang="en-IN"/>
-                    </a:p>
-                  </a:txBody>
-                  <a:tcPr/>
-                </a:tc>
-                <a:tc>
-                  <a:txBody>
-                    <a:bodyPr/>
-                    <a:lstStyle/>
-                    <a:p>
-                      <a:endParaRPr lang="en-IN"/>
-                    </a:p>
-                  </a:txBody>
-                  <a:tcPr/>
-                </a:tc>
-                <a:tc>
-                  <a:txBody>
-                    <a:bodyPr/>
-                    <a:lstStyle/>
-                    <a:p>
-                      <a:endParaRPr lang="en-IN"/>
-                    </a:p>
-                  </a:txBody>
-                  <a:tcPr/>
-                </a:tc>
-                <a:extLst>
-                  <a:ext uri="{0D108BD9-81ED-4DB2-BD59-A6C34878D82A}">
-                    <a16:rowId xmlns:a16="http://schemas.microsoft.com/office/drawing/2014/main" val="2133395301"/>
-                  </a:ext>
-                </a:extLst>
-              </a:tr>
-              <a:tr h="370840">
-                <a:tc>
-                  <a:txBody>
-                    <a:bodyPr/>
-                    <a:lstStyle/>
-                    <a:p>
-                      <a:endParaRPr lang="en-IN"/>
-                    </a:p>
-                  </a:txBody>
-                  <a:tcPr/>
-                </a:tc>
-                <a:tc>
-                  <a:txBody>
-                    <a:bodyPr/>
-                    <a:lstStyle/>
-                    <a:p>
-                      <a:endParaRPr lang="en-IN"/>
-                    </a:p>
-                  </a:txBody>
-                  <a:tcPr/>
-                </a:tc>
-                <a:tc>
-                  <a:txBody>
-                    <a:bodyPr/>
-                    <a:lstStyle/>
-                    <a:p>
-                      <a:endParaRPr lang="en-IN" dirty="0"/>
-                    </a:p>
-                  </a:txBody>
-                  <a:tcPr/>
-                </a:tc>
-                <a:extLst>
-                  <a:ext uri="{0D108BD9-81ED-4DB2-BD59-A6C34878D82A}">
-                    <a16:rowId xmlns:a16="http://schemas.microsoft.com/office/drawing/2014/main" val="2477663498"/>
-                  </a:ext>
-                </a:extLst>
-              </a:tr>
-            </a:tbl>
-          </a:graphicData>
-        </a:graphic>
-      </p:graphicFrame>
-    </p:spTree>
-    <p:extLst>
-      <p:ext uri="{BB962C8B-B14F-4D97-AF65-F5344CB8AC3E}">
-        <p14:creationId xmlns:p14="http://schemas.microsoft.com/office/powerpoint/2010/main" val="3871821239"/>
-      </p:ext>
-    </p:extLst>
-  </p:cSld>
-  <p:clrMapOvr>
-    <a:masterClrMapping/>
-  </p:clrMapOvr>
-</p:sld>
-</file>
-
-<file path=ppt/slides/slide20.xml><?xml version="1.0" encoding="utf-8"?>
+<file path=ppt/slides/slide21.xml><?xml version="1.0" encoding="utf-8"?>
 <p:sld xmlns:a="http://schemas.openxmlformats.org/drawingml/2006/main" xmlns:r="http://schemas.openxmlformats.org/officeDocument/2006/relationships" xmlns:p="http://schemas.openxmlformats.org/presentationml/2006/main">
   <p:cSld>
     <p:spTree>
@@ -22034,7 +22474,7 @@
 </p:sld>
 </file>
 
-<file path=ppt/slides/slide21.xml><?xml version="1.0" encoding="utf-8"?>
+<file path=ppt/slides/slide22.xml><?xml version="1.0" encoding="utf-8"?>
 <p:sld xmlns:a="http://schemas.openxmlformats.org/drawingml/2006/main" xmlns:r="http://schemas.openxmlformats.org/officeDocument/2006/relationships" xmlns:p="http://schemas.openxmlformats.org/presentationml/2006/main">
   <p:cSld>
     <p:spTree>
@@ -23413,7 +23853,7 @@
 </p:sld>
 </file>
 
-<file path=ppt/slides/slide22.xml><?xml version="1.0" encoding="utf-8"?>
+<file path=ppt/slides/slide23.xml><?xml version="1.0" encoding="utf-8"?>
 <p:sld xmlns:a="http://schemas.openxmlformats.org/drawingml/2006/main" xmlns:r="http://schemas.openxmlformats.org/officeDocument/2006/relationships" xmlns:p="http://schemas.openxmlformats.org/presentationml/2006/main">
   <p:cSld>
     <p:spTree>
@@ -25336,7 +25776,7 @@
 </p:sld>
 </file>
 
-<file path=ppt/slides/slide23.xml><?xml version="1.0" encoding="utf-8"?>
+<file path=ppt/slides/slide24.xml><?xml version="1.0" encoding="utf-8"?>
 <p:sld xmlns:a="http://schemas.openxmlformats.org/drawingml/2006/main" xmlns:r="http://schemas.openxmlformats.org/officeDocument/2006/relationships" xmlns:p="http://schemas.openxmlformats.org/presentationml/2006/main">
   <p:cSld>
     <p:spTree>
@@ -25686,7 +26126,7 @@
 </p:sld>
 </file>
 
-<file path=ppt/slides/slide24.xml><?xml version="1.0" encoding="utf-8"?>
+<file path=ppt/slides/slide25.xml><?xml version="1.0" encoding="utf-8"?>
 <p:sld xmlns:a="http://schemas.openxmlformats.org/drawingml/2006/main" xmlns:r="http://schemas.openxmlformats.org/officeDocument/2006/relationships" xmlns:p="http://schemas.openxmlformats.org/presentationml/2006/main">
   <p:cSld>
     <p:spTree>
@@ -25744,7 +26184,7 @@
 </p:sld>
 </file>
 
-<file path=ppt/slides/slide25.xml><?xml version="1.0" encoding="utf-8"?>
+<file path=ppt/slides/slide26.xml><?xml version="1.0" encoding="utf-8"?>
 <p:sld xmlns:a="http://schemas.openxmlformats.org/drawingml/2006/main" xmlns:r="http://schemas.openxmlformats.org/officeDocument/2006/relationships" xmlns:p="http://schemas.openxmlformats.org/presentationml/2006/main">
   <p:cSld>
     <p:spTree>
@@ -25832,7 +26272,7 @@
 </p:sld>
 </file>
 
-<file path=ppt/slides/slide26.xml><?xml version="1.0" encoding="utf-8"?>
+<file path=ppt/slides/slide27.xml><?xml version="1.0" encoding="utf-8"?>
 <p:sld xmlns:a="http://schemas.openxmlformats.org/drawingml/2006/main" xmlns:r="http://schemas.openxmlformats.org/officeDocument/2006/relationships" xmlns:p="http://schemas.openxmlformats.org/presentationml/2006/main">
   <p:cSld>
     <p:spTree>
@@ -26010,7 +26450,7 @@
 </p:sld>
 </file>
 
-<file path=ppt/slides/slide27.xml><?xml version="1.0" encoding="utf-8"?>
+<file path=ppt/slides/slide28.xml><?xml version="1.0" encoding="utf-8"?>
 <p:sld xmlns:a="http://schemas.openxmlformats.org/drawingml/2006/main" xmlns:r="http://schemas.openxmlformats.org/officeDocument/2006/relationships" xmlns:p="http://schemas.openxmlformats.org/presentationml/2006/main">
   <p:cSld>
     <p:spTree>
@@ -27265,7 +27705,7 @@
 </p:sld>
 </file>
 
-<file path=ppt/slides/slide28.xml><?xml version="1.0" encoding="utf-8"?>
+<file path=ppt/slides/slide29.xml><?xml version="1.0" encoding="utf-8"?>
 <p:sld xmlns:a="http://schemas.openxmlformats.org/drawingml/2006/main" xmlns:r="http://schemas.openxmlformats.org/officeDocument/2006/relationships" xmlns:p="http://schemas.openxmlformats.org/presentationml/2006/main">
   <p:cSld>
     <p:spTree>
@@ -29383,7 +29823,184 @@
 </p:sld>
 </file>
 
-<file path=ppt/slides/slide29.xml><?xml version="1.0" encoding="utf-8"?>
+<file path=ppt/slides/slide3.xml><?xml version="1.0" encoding="utf-8"?>
+<p:sld xmlns:a="http://schemas.openxmlformats.org/drawingml/2006/main" xmlns:r="http://schemas.openxmlformats.org/officeDocument/2006/relationships" xmlns:p="http://schemas.openxmlformats.org/presentationml/2006/main">
+  <p:cSld>
+    <p:spTree>
+      <p:nvGrpSpPr>
+        <p:cNvPr id="1" name=""/>
+        <p:cNvGrpSpPr/>
+        <p:nvPr/>
+      </p:nvGrpSpPr>
+      <p:grpSpPr>
+        <a:xfrm>
+          <a:off x="0" y="0"/>
+          <a:ext cx="0" cy="0"/>
+          <a:chOff x="0" y="0"/>
+          <a:chExt cx="0" cy="0"/>
+        </a:xfrm>
+      </p:grpSpPr>
+      <p:sp>
+        <p:nvSpPr>
+          <p:cNvPr id="3" name="Title 2"/>
+          <p:cNvSpPr>
+            <a:spLocks noGrp="1"/>
+          </p:cNvSpPr>
+          <p:nvPr>
+            <p:ph type="title"/>
+          </p:nvPr>
+        </p:nvSpPr>
+        <p:spPr>
+          <a:xfrm>
+            <a:off x="521208" y="448056"/>
+            <a:ext cx="11309348" cy="640080"/>
+          </a:xfrm>
+        </p:spPr>
+        <p:txBody>
+          <a:bodyPr>
+            <a:normAutofit/>
+          </a:bodyPr>
+          <a:lstStyle/>
+          <a:p>
+            <a:r>
+              <a:rPr lang="en-US" dirty="0"/>
+              <a:t>Contents</a:t>
+            </a:r>
+          </a:p>
+        </p:txBody>
+      </p:sp>
+      <p:sp>
+        <p:nvSpPr>
+          <p:cNvPr id="2" name="Content Placeholder 1"/>
+          <p:cNvSpPr>
+            <a:spLocks noGrp="1"/>
+          </p:cNvSpPr>
+          <p:nvPr>
+            <p:ph sz="half" idx="4294967295"/>
+          </p:nvPr>
+        </p:nvSpPr>
+        <p:spPr>
+          <a:xfrm>
+            <a:off x="1755648" y="1294726"/>
+            <a:ext cx="10074908" cy="4539403"/>
+          </a:xfrm>
+        </p:spPr>
+        <p:txBody>
+          <a:bodyPr>
+            <a:noAutofit/>
+          </a:bodyPr>
+          <a:lstStyle/>
+          <a:p>
+            <a:r>
+              <a:rPr lang="en-US" dirty="0"/>
+              <a:t>This template is designed to be used as a template as well as a guide to make your own accessible templates. Check out the Accessibility tips on the following pages. Contents of this guide are listed below: </a:t>
+            </a:r>
+          </a:p>
+          <a:p>
+            <a:pPr marL="285750" indent="-285750">
+              <a:buFont typeface="Arial" panose="020B0604020202020204" pitchFamily="34" charset="0"/>
+              <a:buChar char="•"/>
+            </a:pPr>
+            <a:r>
+              <a:rPr lang="en-US" dirty="0"/>
+              <a:t>Scope</a:t>
+            </a:r>
+          </a:p>
+          <a:p>
+            <a:pPr marL="285750" indent="-285750">
+              <a:buFont typeface="Arial" panose="020B0604020202020204" pitchFamily="34" charset="0"/>
+              <a:buChar char="•"/>
+            </a:pPr>
+            <a:r>
+              <a:rPr lang="en-US" dirty="0"/>
+              <a:t>Functional Requirements</a:t>
+            </a:r>
+          </a:p>
+          <a:p>
+            <a:pPr marL="285750" indent="-285750">
+              <a:buFont typeface="Arial" panose="020B0604020202020204" pitchFamily="34" charset="0"/>
+              <a:buChar char="•"/>
+            </a:pPr>
+            <a:r>
+              <a:rPr lang="en-US" dirty="0"/>
+              <a:t>Dependencies</a:t>
+            </a:r>
+          </a:p>
+          <a:p>
+            <a:pPr marL="285750" indent="-285750">
+              <a:buFont typeface="Arial" panose="020B0604020202020204" pitchFamily="34" charset="0"/>
+              <a:buChar char="•"/>
+            </a:pPr>
+            <a:r>
+              <a:rPr lang="en-US" dirty="0"/>
+              <a:t>Risks</a:t>
+            </a:r>
+          </a:p>
+          <a:p>
+            <a:pPr marL="285750" indent="-285750">
+              <a:buFont typeface="Arial" panose="020B0604020202020204" pitchFamily="34" charset="0"/>
+              <a:buChar char="•"/>
+            </a:pPr>
+            <a:r>
+              <a:rPr lang="en-US" dirty="0"/>
+              <a:t>High Level execution design</a:t>
+            </a:r>
+          </a:p>
+          <a:p>
+            <a:pPr marL="285750" indent="-285750">
+              <a:buFont typeface="Arial" panose="020B0604020202020204" pitchFamily="34" charset="0"/>
+              <a:buChar char="•"/>
+            </a:pPr>
+            <a:r>
+              <a:rPr lang="en-US" dirty="0"/>
+              <a:t>Mockup/ GUI template</a:t>
+            </a:r>
+          </a:p>
+          <a:p>
+            <a:pPr marL="285750" indent="-285750">
+              <a:buFont typeface="Arial" panose="020B0604020202020204" pitchFamily="34" charset="0"/>
+              <a:buChar char="•"/>
+            </a:pPr>
+            <a:r>
+              <a:rPr lang="en-US" dirty="0"/>
+              <a:t>Pseudo code and code snippets</a:t>
+            </a:r>
+          </a:p>
+          <a:p>
+            <a:pPr marL="285750" indent="-285750">
+              <a:buFont typeface="Arial" panose="020B0604020202020204" pitchFamily="34" charset="0"/>
+              <a:buChar char="•"/>
+            </a:pPr>
+            <a:endParaRPr lang="en-US" dirty="0"/>
+          </a:p>
+          <a:p>
+            <a:endParaRPr lang="en-US" dirty="0"/>
+          </a:p>
+          <a:p>
+            <a:endParaRPr lang="en-US" dirty="0"/>
+          </a:p>
+          <a:p>
+            <a:endParaRPr lang="en-US" dirty="0"/>
+          </a:p>
+          <a:p>
+            <a:endParaRPr lang="en-US" dirty="0"/>
+          </a:p>
+        </p:txBody>
+      </p:sp>
+    </p:spTree>
+    <p:extLst>
+      <p:ext uri="{BB962C8B-B14F-4D97-AF65-F5344CB8AC3E}">
+        <p14:creationId xmlns:p14="http://schemas.microsoft.com/office/powerpoint/2010/main" val="3468383259"/>
+      </p:ext>
+    </p:extLst>
+  </p:cSld>
+  <p:clrMapOvr>
+    <a:masterClrMapping/>
+  </p:clrMapOvr>
+</p:sld>
+</file>
+
+<file path=ppt/slides/slide30.xml><?xml version="1.0" encoding="utf-8"?>
 <p:sld xmlns:a="http://schemas.openxmlformats.org/drawingml/2006/main" xmlns:r="http://schemas.openxmlformats.org/officeDocument/2006/relationships" xmlns:p="http://schemas.openxmlformats.org/presentationml/2006/main">
   <p:cSld>
     <p:spTree>
@@ -30496,184 +31113,7 @@
 </p:sld>
 </file>
 
-<file path=ppt/slides/slide3.xml><?xml version="1.0" encoding="utf-8"?>
-<p:sld xmlns:a="http://schemas.openxmlformats.org/drawingml/2006/main" xmlns:r="http://schemas.openxmlformats.org/officeDocument/2006/relationships" xmlns:p="http://schemas.openxmlformats.org/presentationml/2006/main">
-  <p:cSld>
-    <p:spTree>
-      <p:nvGrpSpPr>
-        <p:cNvPr id="1" name=""/>
-        <p:cNvGrpSpPr/>
-        <p:nvPr/>
-      </p:nvGrpSpPr>
-      <p:grpSpPr>
-        <a:xfrm>
-          <a:off x="0" y="0"/>
-          <a:ext cx="0" cy="0"/>
-          <a:chOff x="0" y="0"/>
-          <a:chExt cx="0" cy="0"/>
-        </a:xfrm>
-      </p:grpSpPr>
-      <p:sp>
-        <p:nvSpPr>
-          <p:cNvPr id="3" name="Title 2"/>
-          <p:cNvSpPr>
-            <a:spLocks noGrp="1"/>
-          </p:cNvSpPr>
-          <p:nvPr>
-            <p:ph type="title"/>
-          </p:nvPr>
-        </p:nvSpPr>
-        <p:spPr>
-          <a:xfrm>
-            <a:off x="521208" y="448056"/>
-            <a:ext cx="11309348" cy="640080"/>
-          </a:xfrm>
-        </p:spPr>
-        <p:txBody>
-          <a:bodyPr>
-            <a:normAutofit/>
-          </a:bodyPr>
-          <a:lstStyle/>
-          <a:p>
-            <a:r>
-              <a:rPr lang="en-US" dirty="0"/>
-              <a:t>Contents</a:t>
-            </a:r>
-          </a:p>
-        </p:txBody>
-      </p:sp>
-      <p:sp>
-        <p:nvSpPr>
-          <p:cNvPr id="2" name="Content Placeholder 1"/>
-          <p:cNvSpPr>
-            <a:spLocks noGrp="1"/>
-          </p:cNvSpPr>
-          <p:nvPr>
-            <p:ph sz="half" idx="4294967295"/>
-          </p:nvPr>
-        </p:nvSpPr>
-        <p:spPr>
-          <a:xfrm>
-            <a:off x="1755648" y="1294726"/>
-            <a:ext cx="10074908" cy="4539403"/>
-          </a:xfrm>
-        </p:spPr>
-        <p:txBody>
-          <a:bodyPr>
-            <a:noAutofit/>
-          </a:bodyPr>
-          <a:lstStyle/>
-          <a:p>
-            <a:r>
-              <a:rPr lang="en-US" dirty="0"/>
-              <a:t>This template is designed to be used as a template as well as a guide to make your own accessible templates. Check out the Accessibility tips on the following pages. Contents of this guide are listed below: </a:t>
-            </a:r>
-          </a:p>
-          <a:p>
-            <a:pPr marL="285750" indent="-285750">
-              <a:buFont typeface="Arial" panose="020B0604020202020204" pitchFamily="34" charset="0"/>
-              <a:buChar char="•"/>
-            </a:pPr>
-            <a:r>
-              <a:rPr lang="en-US" dirty="0"/>
-              <a:t>Scope</a:t>
-            </a:r>
-          </a:p>
-          <a:p>
-            <a:pPr marL="285750" indent="-285750">
-              <a:buFont typeface="Arial" panose="020B0604020202020204" pitchFamily="34" charset="0"/>
-              <a:buChar char="•"/>
-            </a:pPr>
-            <a:r>
-              <a:rPr lang="en-US" dirty="0"/>
-              <a:t>Functional Requirements</a:t>
-            </a:r>
-          </a:p>
-          <a:p>
-            <a:pPr marL="285750" indent="-285750">
-              <a:buFont typeface="Arial" panose="020B0604020202020204" pitchFamily="34" charset="0"/>
-              <a:buChar char="•"/>
-            </a:pPr>
-            <a:r>
-              <a:rPr lang="en-US" dirty="0"/>
-              <a:t>Dependencies</a:t>
-            </a:r>
-          </a:p>
-          <a:p>
-            <a:pPr marL="285750" indent="-285750">
-              <a:buFont typeface="Arial" panose="020B0604020202020204" pitchFamily="34" charset="0"/>
-              <a:buChar char="•"/>
-            </a:pPr>
-            <a:r>
-              <a:rPr lang="en-US" dirty="0"/>
-              <a:t>Risks</a:t>
-            </a:r>
-          </a:p>
-          <a:p>
-            <a:pPr marL="285750" indent="-285750">
-              <a:buFont typeface="Arial" panose="020B0604020202020204" pitchFamily="34" charset="0"/>
-              <a:buChar char="•"/>
-            </a:pPr>
-            <a:r>
-              <a:rPr lang="en-US" dirty="0"/>
-              <a:t>High Level execution design</a:t>
-            </a:r>
-          </a:p>
-          <a:p>
-            <a:pPr marL="285750" indent="-285750">
-              <a:buFont typeface="Arial" panose="020B0604020202020204" pitchFamily="34" charset="0"/>
-              <a:buChar char="•"/>
-            </a:pPr>
-            <a:r>
-              <a:rPr lang="en-US" dirty="0"/>
-              <a:t>Mockup/ GUI template</a:t>
-            </a:r>
-          </a:p>
-          <a:p>
-            <a:pPr marL="285750" indent="-285750">
-              <a:buFont typeface="Arial" panose="020B0604020202020204" pitchFamily="34" charset="0"/>
-              <a:buChar char="•"/>
-            </a:pPr>
-            <a:r>
-              <a:rPr lang="en-US" dirty="0"/>
-              <a:t>Pseudo code and code snippets</a:t>
-            </a:r>
-          </a:p>
-          <a:p>
-            <a:pPr marL="285750" indent="-285750">
-              <a:buFont typeface="Arial" panose="020B0604020202020204" pitchFamily="34" charset="0"/>
-              <a:buChar char="•"/>
-            </a:pPr>
-            <a:endParaRPr lang="en-US" dirty="0"/>
-          </a:p>
-          <a:p>
-            <a:endParaRPr lang="en-US" dirty="0"/>
-          </a:p>
-          <a:p>
-            <a:endParaRPr lang="en-US" dirty="0"/>
-          </a:p>
-          <a:p>
-            <a:endParaRPr lang="en-US" dirty="0"/>
-          </a:p>
-          <a:p>
-            <a:endParaRPr lang="en-US" dirty="0"/>
-          </a:p>
-        </p:txBody>
-      </p:sp>
-    </p:spTree>
-    <p:extLst>
-      <p:ext uri="{BB962C8B-B14F-4D97-AF65-F5344CB8AC3E}">
-        <p14:creationId xmlns:p14="http://schemas.microsoft.com/office/powerpoint/2010/main" val="3468383259"/>
-      </p:ext>
-    </p:extLst>
-  </p:cSld>
-  <p:clrMapOvr>
-    <a:masterClrMapping/>
-  </p:clrMapOvr>
-</p:sld>
-</file>
-
-<file path=ppt/slides/slide30.xml><?xml version="1.0" encoding="utf-8"?>
+<file path=ppt/slides/slide31.xml><?xml version="1.0" encoding="utf-8"?>
 <p:sld xmlns:a="http://schemas.openxmlformats.org/drawingml/2006/main" xmlns:r="http://schemas.openxmlformats.org/officeDocument/2006/relationships" xmlns:p="http://schemas.openxmlformats.org/presentationml/2006/main">
   <p:cSld>
     <p:spTree>
@@ -32436,7 +32876,7 @@
 </p:sld>
 </file>
 
-<file path=ppt/slides/slide31.xml><?xml version="1.0" encoding="utf-8"?>
+<file path=ppt/slides/slide32.xml><?xml version="1.0" encoding="utf-8"?>
 <p:sld xmlns:a="http://schemas.openxmlformats.org/drawingml/2006/main" xmlns:r="http://schemas.openxmlformats.org/officeDocument/2006/relationships" xmlns:p="http://schemas.openxmlformats.org/presentationml/2006/main">
   <p:cSld>
     <p:spTree>
@@ -33459,7 +33899,7 @@
 </p:sld>
 </file>
 
-<file path=ppt/slides/slide32.xml><?xml version="1.0" encoding="utf-8"?>
+<file path=ppt/slides/slide33.xml><?xml version="1.0" encoding="utf-8"?>
 <p:sld xmlns:a="http://schemas.openxmlformats.org/drawingml/2006/main" xmlns:r="http://schemas.openxmlformats.org/officeDocument/2006/relationships" xmlns:p="http://schemas.openxmlformats.org/presentationml/2006/main">
   <p:cSld>
     <p:spTree>
@@ -34838,7 +35278,7 @@
 </p:sld>
 </file>
 
-<file path=ppt/slides/slide33.xml><?xml version="1.0" encoding="utf-8"?>
+<file path=ppt/slides/slide34.xml><?xml version="1.0" encoding="utf-8"?>
 <p:sld xmlns:a="http://schemas.openxmlformats.org/drawingml/2006/main" xmlns:r="http://schemas.openxmlformats.org/officeDocument/2006/relationships" xmlns:p="http://schemas.openxmlformats.org/presentationml/2006/main">
   <p:cSld>
     <p:spTree>
@@ -36761,7 +37201,7 @@
 </p:sld>
 </file>
 
-<file path=ppt/slides/slide34.xml><?xml version="1.0" encoding="utf-8"?>
+<file path=ppt/slides/slide35.xml><?xml version="1.0" encoding="utf-8"?>
 <p:sld xmlns:a="http://schemas.openxmlformats.org/drawingml/2006/main" xmlns:r="http://schemas.openxmlformats.org/officeDocument/2006/relationships" xmlns:p="http://schemas.openxmlformats.org/presentationml/2006/main">
   <p:cSld>
     <p:spTree>
@@ -41659,534 +42099,45 @@
           <a:p>
             <a:r>
               <a:rPr lang="en-US" dirty="0"/>
-              <a:t>Project Execution – High Level</a:t>
+              <a:t>GUI / Mockups ….2</a:t>
             </a:r>
           </a:p>
         </p:txBody>
       </p:sp>
-      <p:grpSp>
-        <p:nvGrpSpPr>
-          <p:cNvPr id="31" name="Group 30" descr="Step number 1"/>
-          <p:cNvGrpSpPr/>
-          <p:nvPr/>
-        </p:nvGrpSpPr>
-        <p:grpSpPr bwMode="gray">
-          <a:xfrm>
-            <a:off x="1086365" y="1445992"/>
-            <a:ext cx="380382" cy="296049"/>
-            <a:chOff x="6741828" y="1435344"/>
-            <a:chExt cx="380382" cy="296049"/>
-          </a:xfrm>
-        </p:grpSpPr>
-        <p:sp>
-          <p:nvSpPr>
-            <p:cNvPr id="32" name="Rectangle 31" descr="Step number 1"/>
-            <p:cNvSpPr/>
-            <p:nvPr/>
-          </p:nvSpPr>
-          <p:spPr bwMode="gray">
-            <a:xfrm>
-              <a:off x="6793669" y="1452347"/>
-              <a:ext cx="279292" cy="279046"/>
-            </a:xfrm>
-            <a:prstGeom prst="rect">
-              <a:avLst/>
-            </a:prstGeom>
-            <a:solidFill>
-              <a:schemeClr val="accent2">
-                <a:lumMod val="75000"/>
-              </a:schemeClr>
-            </a:solidFill>
-            <a:ln>
-              <a:noFill/>
-            </a:ln>
-          </p:spPr>
-          <p:style>
-            <a:lnRef idx="2">
-              <a:schemeClr val="accent1">
-                <a:shade val="50000"/>
-              </a:schemeClr>
-            </a:lnRef>
-            <a:fillRef idx="1">
-              <a:schemeClr val="accent1"/>
-            </a:fillRef>
-            <a:effectRef idx="0">
-              <a:schemeClr val="accent1"/>
-            </a:effectRef>
-            <a:fontRef idx="minor">
-              <a:schemeClr val="lt1"/>
-            </a:fontRef>
-          </p:style>
-          <p:txBody>
-            <a:bodyPr rtlCol="0" anchor="ctr"/>
-            <a:lstStyle/>
-            <a:p>
-              <a:pPr algn="ctr"/>
-              <a:endParaRPr lang="en-US"/>
-            </a:p>
-          </p:txBody>
-        </p:sp>
-        <p:sp>
-          <p:nvSpPr>
-            <p:cNvPr id="33" name="TextBox 32" descr="Small square with numeral 1 inside "/>
-            <p:cNvSpPr txBox="1"/>
-            <p:nvPr/>
-          </p:nvSpPr>
-          <p:spPr bwMode="gray">
-            <a:xfrm>
-              <a:off x="6741828" y="1435344"/>
-              <a:ext cx="380382" cy="276999"/>
-            </a:xfrm>
-            <a:prstGeom prst="rect">
-              <a:avLst/>
-            </a:prstGeom>
-            <a:noFill/>
-          </p:spPr>
-          <p:txBody>
-            <a:bodyPr wrap="square" rtlCol="0">
-              <a:spAutoFit/>
-            </a:bodyPr>
-            <a:lstStyle/>
-            <a:p>
-              <a:pPr algn="ctr"/>
-              <a:r>
-                <a:rPr lang="en-US" sz="1200" b="1" dirty="0">
-                  <a:solidFill>
-                    <a:schemeClr val="bg1"/>
-                  </a:solidFill>
-                  <a:latin typeface="Segoe UI Semibold" panose="020B0702040204020203" pitchFamily="34" charset="0"/>
-                  <a:cs typeface="Segoe UI Semibold" panose="020B0702040204020203" pitchFamily="34" charset="0"/>
-                </a:rPr>
-                <a:t>1</a:t>
-              </a:r>
-              <a:endParaRPr lang="en-US" sz="1100" b="1" dirty="0">
-                <a:solidFill>
-                  <a:schemeClr val="bg1"/>
-                </a:solidFill>
-                <a:latin typeface="Segoe UI Semibold" panose="020B0702040204020203" pitchFamily="34" charset="0"/>
-                <a:cs typeface="Segoe UI Semibold" panose="020B0702040204020203" pitchFamily="34" charset="0"/>
-              </a:endParaRPr>
-            </a:p>
-          </p:txBody>
-        </p:sp>
-      </p:grpSp>
-      <p:sp>
-        <p:nvSpPr>
-          <p:cNvPr id="4" name="Rectangle: Rounded Corners 3">
+      <p:pic>
+        <p:nvPicPr>
+          <p:cNvPr id="4" name="Picture 3">
             <a:extLst>
               <a:ext uri="{FF2B5EF4-FFF2-40B4-BE49-F238E27FC236}">
-                <a16:creationId xmlns:a16="http://schemas.microsoft.com/office/drawing/2014/main" id="{0587C6C6-24E9-4114-BAEF-B97D27A588E1}"/>
+                <a16:creationId xmlns:a16="http://schemas.microsoft.com/office/drawing/2014/main" id="{DC43B673-8387-40E1-9028-95073ED4FF82}"/>
               </a:ext>
             </a:extLst>
           </p:cNvPr>
-          <p:cNvSpPr/>
+          <p:cNvPicPr>
+            <a:picLocks noChangeAspect="1"/>
+          </p:cNvPicPr>
           <p:nvPr/>
-        </p:nvSpPr>
+        </p:nvPicPr>
+        <p:blipFill>
+          <a:blip r:embed="rId3"/>
+          <a:stretch>
+            <a:fillRect/>
+          </a:stretch>
+        </p:blipFill>
         <p:spPr>
           <a:xfrm>
-            <a:off x="1915886" y="1462995"/>
-            <a:ext cx="3178628" cy="400639"/>
+            <a:off x="521208" y="1296063"/>
+            <a:ext cx="11371914" cy="4525850"/>
           </a:xfrm>
-          <a:prstGeom prst="roundRect">
+          <a:prstGeom prst="rect">
             <a:avLst/>
           </a:prstGeom>
         </p:spPr>
-        <p:style>
-          <a:lnRef idx="2">
-            <a:schemeClr val="accent1">
-              <a:shade val="50000"/>
-            </a:schemeClr>
-          </a:lnRef>
-          <a:fillRef idx="1">
-            <a:schemeClr val="accent1"/>
-          </a:fillRef>
-          <a:effectRef idx="0">
-            <a:schemeClr val="accent1"/>
-          </a:effectRef>
-          <a:fontRef idx="minor">
-            <a:schemeClr val="lt1"/>
-          </a:fontRef>
-        </p:style>
-        <p:txBody>
-          <a:bodyPr rtlCol="0" anchor="ctr"/>
-          <a:lstStyle/>
-          <a:p>
-            <a:pPr algn="ctr"/>
-            <a:r>
-              <a:rPr lang="en-US" sz="1400" dirty="0"/>
-              <a:t>Select scheme name from Dropdown`</a:t>
-            </a:r>
-          </a:p>
-        </p:txBody>
-      </p:sp>
-      <p:sp>
-        <p:nvSpPr>
-          <p:cNvPr id="11" name="Rectangle: Rounded Corners 10">
-            <a:extLst>
-              <a:ext uri="{FF2B5EF4-FFF2-40B4-BE49-F238E27FC236}">
-                <a16:creationId xmlns:a16="http://schemas.microsoft.com/office/drawing/2014/main" id="{33CE17BD-9864-485E-8F43-99E10AF52DD2}"/>
-              </a:ext>
-            </a:extLst>
-          </p:cNvPr>
-          <p:cNvSpPr/>
-          <p:nvPr/>
-        </p:nvSpPr>
-        <p:spPr>
-          <a:xfrm>
-            <a:off x="1915886" y="2038173"/>
-            <a:ext cx="3178628" cy="400639"/>
-          </a:xfrm>
-          <a:prstGeom prst="roundRect">
-            <a:avLst/>
-          </a:prstGeom>
-        </p:spPr>
-        <p:style>
-          <a:lnRef idx="2">
-            <a:schemeClr val="accent1">
-              <a:shade val="50000"/>
-            </a:schemeClr>
-          </a:lnRef>
-          <a:fillRef idx="1">
-            <a:schemeClr val="accent1"/>
-          </a:fillRef>
-          <a:effectRef idx="0">
-            <a:schemeClr val="accent1"/>
-          </a:effectRef>
-          <a:fontRef idx="minor">
-            <a:schemeClr val="lt1"/>
-          </a:fontRef>
-        </p:style>
-        <p:txBody>
-          <a:bodyPr rtlCol="0" anchor="ctr"/>
-          <a:lstStyle/>
-          <a:p>
-            <a:pPr algn="ctr"/>
-            <a:r>
-              <a:rPr lang="en-US" sz="1400" dirty="0"/>
-              <a:t>User clicks update button</a:t>
-            </a:r>
-          </a:p>
-        </p:txBody>
-      </p:sp>
-      <p:sp>
-        <p:nvSpPr>
-          <p:cNvPr id="12" name="Rectangle: Rounded Corners 11">
-            <a:extLst>
-              <a:ext uri="{FF2B5EF4-FFF2-40B4-BE49-F238E27FC236}">
-                <a16:creationId xmlns:a16="http://schemas.microsoft.com/office/drawing/2014/main" id="{B2049D71-0E6F-449D-8ECD-B94D8B8A04D1}"/>
-              </a:ext>
-            </a:extLst>
-          </p:cNvPr>
-          <p:cNvSpPr/>
-          <p:nvPr/>
-        </p:nvSpPr>
-        <p:spPr>
-          <a:xfrm>
-            <a:off x="1915886" y="2613351"/>
-            <a:ext cx="3178628" cy="400639"/>
-          </a:xfrm>
-          <a:prstGeom prst="roundRect">
-            <a:avLst/>
-          </a:prstGeom>
-        </p:spPr>
-        <p:style>
-          <a:lnRef idx="2">
-            <a:schemeClr val="accent1">
-              <a:shade val="50000"/>
-            </a:schemeClr>
-          </a:lnRef>
-          <a:fillRef idx="1">
-            <a:schemeClr val="accent1"/>
-          </a:fillRef>
-          <a:effectRef idx="0">
-            <a:schemeClr val="accent1"/>
-          </a:effectRef>
-          <a:fontRef idx="minor">
-            <a:schemeClr val="lt1"/>
-          </a:fontRef>
-        </p:style>
-        <p:txBody>
-          <a:bodyPr rtlCol="0" anchor="ctr"/>
-          <a:lstStyle/>
-          <a:p>
-            <a:pPr algn="ctr"/>
-            <a:r>
-              <a:rPr lang="en-US" sz="1400" dirty="0"/>
-              <a:t>Program pulls data from JSON</a:t>
-            </a:r>
-          </a:p>
-        </p:txBody>
-      </p:sp>
-      <p:sp>
-        <p:nvSpPr>
-          <p:cNvPr id="13" name="Rectangle: Rounded Corners 12">
-            <a:extLst>
-              <a:ext uri="{FF2B5EF4-FFF2-40B4-BE49-F238E27FC236}">
-                <a16:creationId xmlns:a16="http://schemas.microsoft.com/office/drawing/2014/main" id="{C376CAC2-8262-4CD3-B15F-8838210F83EB}"/>
-              </a:ext>
-            </a:extLst>
-          </p:cNvPr>
-          <p:cNvSpPr/>
-          <p:nvPr/>
-        </p:nvSpPr>
-        <p:spPr>
-          <a:xfrm>
-            <a:off x="1915886" y="3188529"/>
-            <a:ext cx="3178628" cy="400639"/>
-          </a:xfrm>
-          <a:prstGeom prst="roundRect">
-            <a:avLst/>
-          </a:prstGeom>
-        </p:spPr>
-        <p:style>
-          <a:lnRef idx="2">
-            <a:schemeClr val="accent1">
-              <a:shade val="50000"/>
-            </a:schemeClr>
-          </a:lnRef>
-          <a:fillRef idx="1">
-            <a:schemeClr val="accent1"/>
-          </a:fillRef>
-          <a:effectRef idx="0">
-            <a:schemeClr val="accent1"/>
-          </a:effectRef>
-          <a:fontRef idx="minor">
-            <a:schemeClr val="lt1"/>
-          </a:fontRef>
-        </p:style>
-        <p:txBody>
-          <a:bodyPr rtlCol="0" anchor="ctr"/>
-          <a:lstStyle/>
-          <a:p>
-            <a:pPr algn="ctr"/>
-            <a:r>
-              <a:rPr lang="en-US" sz="1400" dirty="0"/>
-              <a:t>Program filters data based on selected scheme</a:t>
-            </a:r>
-          </a:p>
-        </p:txBody>
-      </p:sp>
-      <p:sp>
-        <p:nvSpPr>
-          <p:cNvPr id="14" name="Rectangle: Rounded Corners 13">
-            <a:extLst>
-              <a:ext uri="{FF2B5EF4-FFF2-40B4-BE49-F238E27FC236}">
-                <a16:creationId xmlns:a16="http://schemas.microsoft.com/office/drawing/2014/main" id="{25EBDFE7-3FC3-402C-9ABD-5153F0FD5086}"/>
-              </a:ext>
-            </a:extLst>
-          </p:cNvPr>
-          <p:cNvSpPr/>
-          <p:nvPr/>
-        </p:nvSpPr>
-        <p:spPr>
-          <a:xfrm>
-            <a:off x="1915886" y="3763707"/>
-            <a:ext cx="3178628" cy="400639"/>
-          </a:xfrm>
-          <a:prstGeom prst="roundRect">
-            <a:avLst/>
-          </a:prstGeom>
-        </p:spPr>
-        <p:style>
-          <a:lnRef idx="2">
-            <a:schemeClr val="accent1">
-              <a:shade val="50000"/>
-            </a:schemeClr>
-          </a:lnRef>
-          <a:fillRef idx="1">
-            <a:schemeClr val="accent1"/>
-          </a:fillRef>
-          <a:effectRef idx="0">
-            <a:schemeClr val="accent1"/>
-          </a:effectRef>
-          <a:fontRef idx="minor">
-            <a:schemeClr val="lt1"/>
-          </a:fontRef>
-        </p:style>
-        <p:txBody>
-          <a:bodyPr rtlCol="0" anchor="ctr"/>
-          <a:lstStyle/>
-          <a:p>
-            <a:pPr algn="ctr"/>
-            <a:r>
-              <a:rPr lang="en-US" sz="1400" dirty="0"/>
-              <a:t>Program displays data &amp; totals</a:t>
-            </a:r>
-          </a:p>
-        </p:txBody>
-      </p:sp>
-      <p:cxnSp>
-        <p:nvCxnSpPr>
-          <p:cNvPr id="8" name="Straight Arrow Connector 7">
-            <a:extLst>
-              <a:ext uri="{FF2B5EF4-FFF2-40B4-BE49-F238E27FC236}">
-                <a16:creationId xmlns:a16="http://schemas.microsoft.com/office/drawing/2014/main" id="{A2C08FBD-2DC5-4E58-8D1C-1396669A2CEA}"/>
-              </a:ext>
-            </a:extLst>
-          </p:cNvPr>
-          <p:cNvCxnSpPr>
-            <a:stCxn id="4" idx="2"/>
-            <a:endCxn id="11" idx="0"/>
-          </p:cNvCxnSpPr>
-          <p:nvPr/>
-        </p:nvCxnSpPr>
-        <p:spPr>
-          <a:xfrm>
-            <a:off x="3505200" y="1863634"/>
-            <a:ext cx="0" cy="174539"/>
-          </a:xfrm>
-          <a:prstGeom prst="straightConnector1">
-            <a:avLst/>
-          </a:prstGeom>
-          <a:ln>
-            <a:tailEnd type="triangle"/>
-          </a:ln>
-        </p:spPr>
-        <p:style>
-          <a:lnRef idx="1">
-            <a:schemeClr val="accent1"/>
-          </a:lnRef>
-          <a:fillRef idx="0">
-            <a:schemeClr val="accent1"/>
-          </a:fillRef>
-          <a:effectRef idx="0">
-            <a:schemeClr val="accent1"/>
-          </a:effectRef>
-          <a:fontRef idx="minor">
-            <a:schemeClr val="tx1"/>
-          </a:fontRef>
-        </p:style>
-      </p:cxnSp>
-      <p:cxnSp>
-        <p:nvCxnSpPr>
-          <p:cNvPr id="10" name="Straight Arrow Connector 9">
-            <a:extLst>
-              <a:ext uri="{FF2B5EF4-FFF2-40B4-BE49-F238E27FC236}">
-                <a16:creationId xmlns:a16="http://schemas.microsoft.com/office/drawing/2014/main" id="{A7CCE346-0A10-4542-9C88-4E90F0551EAB}"/>
-              </a:ext>
-            </a:extLst>
-          </p:cNvPr>
-          <p:cNvCxnSpPr>
-            <a:stCxn id="11" idx="2"/>
-            <a:endCxn id="12" idx="0"/>
-          </p:cNvCxnSpPr>
-          <p:nvPr/>
-        </p:nvCxnSpPr>
-        <p:spPr>
-          <a:xfrm>
-            <a:off x="3505200" y="2438812"/>
-            <a:ext cx="0" cy="174539"/>
-          </a:xfrm>
-          <a:prstGeom prst="straightConnector1">
-            <a:avLst/>
-          </a:prstGeom>
-          <a:ln>
-            <a:tailEnd type="triangle"/>
-          </a:ln>
-        </p:spPr>
-        <p:style>
-          <a:lnRef idx="1">
-            <a:schemeClr val="accent1"/>
-          </a:lnRef>
-          <a:fillRef idx="0">
-            <a:schemeClr val="accent1"/>
-          </a:fillRef>
-          <a:effectRef idx="0">
-            <a:schemeClr val="accent1"/>
-          </a:effectRef>
-          <a:fontRef idx="minor">
-            <a:schemeClr val="tx1"/>
-          </a:fontRef>
-        </p:style>
-      </p:cxnSp>
-      <p:cxnSp>
-        <p:nvCxnSpPr>
-          <p:cNvPr id="17" name="Straight Arrow Connector 16">
-            <a:extLst>
-              <a:ext uri="{FF2B5EF4-FFF2-40B4-BE49-F238E27FC236}">
-                <a16:creationId xmlns:a16="http://schemas.microsoft.com/office/drawing/2014/main" id="{56E360A9-EBF1-459F-8323-DE4CBBCD41F5}"/>
-              </a:ext>
-            </a:extLst>
-          </p:cNvPr>
-          <p:cNvCxnSpPr>
-            <a:stCxn id="12" idx="2"/>
-            <a:endCxn id="13" idx="0"/>
-          </p:cNvCxnSpPr>
-          <p:nvPr/>
-        </p:nvCxnSpPr>
-        <p:spPr>
-          <a:xfrm>
-            <a:off x="3505200" y="3013990"/>
-            <a:ext cx="0" cy="174539"/>
-          </a:xfrm>
-          <a:prstGeom prst="straightConnector1">
-            <a:avLst/>
-          </a:prstGeom>
-          <a:ln>
-            <a:tailEnd type="triangle"/>
-          </a:ln>
-        </p:spPr>
-        <p:style>
-          <a:lnRef idx="1">
-            <a:schemeClr val="accent1"/>
-          </a:lnRef>
-          <a:fillRef idx="0">
-            <a:schemeClr val="accent1"/>
-          </a:fillRef>
-          <a:effectRef idx="0">
-            <a:schemeClr val="accent1"/>
-          </a:effectRef>
-          <a:fontRef idx="minor">
-            <a:schemeClr val="tx1"/>
-          </a:fontRef>
-        </p:style>
-      </p:cxnSp>
-      <p:cxnSp>
-        <p:nvCxnSpPr>
-          <p:cNvPr id="19" name="Straight Arrow Connector 18">
-            <a:extLst>
-              <a:ext uri="{FF2B5EF4-FFF2-40B4-BE49-F238E27FC236}">
-                <a16:creationId xmlns:a16="http://schemas.microsoft.com/office/drawing/2014/main" id="{0C39681A-BE39-4426-B4A0-1D7B051A3685}"/>
-              </a:ext>
-            </a:extLst>
-          </p:cNvPr>
-          <p:cNvCxnSpPr>
-            <a:stCxn id="13" idx="2"/>
-            <a:endCxn id="14" idx="0"/>
-          </p:cNvCxnSpPr>
-          <p:nvPr/>
-        </p:nvCxnSpPr>
-        <p:spPr>
-          <a:xfrm>
-            <a:off x="3505200" y="3589168"/>
-            <a:ext cx="0" cy="174539"/>
-          </a:xfrm>
-          <a:prstGeom prst="straightConnector1">
-            <a:avLst/>
-          </a:prstGeom>
-          <a:ln>
-            <a:tailEnd type="triangle"/>
-          </a:ln>
-        </p:spPr>
-        <p:style>
-          <a:lnRef idx="1">
-            <a:schemeClr val="accent1"/>
-          </a:lnRef>
-          <a:fillRef idx="0">
-            <a:schemeClr val="accent1"/>
-          </a:fillRef>
-          <a:effectRef idx="0">
-            <a:schemeClr val="accent1"/>
-          </a:effectRef>
-          <a:fontRef idx="minor">
-            <a:schemeClr val="tx1"/>
-          </a:fontRef>
-        </p:style>
-      </p:cxnSp>
+      </p:pic>
     </p:spTree>
     <p:extLst>
       <p:ext uri="{BB962C8B-B14F-4D97-AF65-F5344CB8AC3E}">
-        <p14:creationId xmlns:p14="http://schemas.microsoft.com/office/powerpoint/2010/main" val="2160610087"/>
+        <p14:creationId xmlns:p14="http://schemas.microsoft.com/office/powerpoint/2010/main" val="3646359406"/>
       </p:ext>
     </p:extLst>
   </p:cSld>

</xml_diff>

<commit_message>
To Do in React v2-0 w/ context,useRef,state uplifting,useEffect working,doby sorting works, hide completed works
</commit_message>
<xml_diff>
--- a/ToDo React Project Specifications.pptx
+++ b/ToDo React Project Specifications.pptx
@@ -11429,25 +11429,25 @@
           <p:nvPr>
             <p:extLst>
               <p:ext uri="{D42A27DB-BD31-4B8C-83A1-F6EECF244321}">
-                <p14:modId xmlns:p14="http://schemas.microsoft.com/office/powerpoint/2010/main" val="1689126032"/>
+                <p14:modId xmlns:p14="http://schemas.microsoft.com/office/powerpoint/2010/main" val="190778156"/>
               </p:ext>
             </p:extLst>
           </p:nvPr>
         </p:nvGraphicFramePr>
         <p:xfrm>
-          <a:off x="1838076" y="1379828"/>
-          <a:ext cx="914400" cy="771525"/>
+          <a:off x="1939925" y="1498600"/>
+          <a:ext cx="711200" cy="533400"/>
         </p:xfrm>
         <a:graphic>
           <a:graphicData uri="http://schemas.openxmlformats.org/presentationml/2006/ole">
             <mc:AlternateContent xmlns:mc="http://schemas.openxmlformats.org/markup-compatibility/2006">
               <mc:Choice xmlns:v="urn:schemas-microsoft-com:vml" Requires="v">
-                <p:oleObj spid="_x0000_s1030" name="Packager Shell Object" showAsIcon="1" r:id="rId4" imgW="914400" imgH="771480" progId="Package">
+                <p:oleObj spid="_x0000_s1036" name="Packager Shell Object" showAsIcon="1" r:id="rId4" imgW="711360" imgH="532800" progId="Package">
                   <p:embed/>
                 </p:oleObj>
               </mc:Choice>
               <mc:Fallback>
-                <p:oleObj name="Packager Shell Object" showAsIcon="1" r:id="rId4" imgW="914400" imgH="771480" progId="Package">
+                <p:oleObj name="Packager Shell Object" showAsIcon="1" r:id="rId4" imgW="711360" imgH="532800" progId="Package">
                   <p:embed/>
                   <p:pic>
                     <p:nvPicPr>
@@ -11463,8 +11463,71 @@
                     </p:blipFill>
                     <p:spPr>
                       <a:xfrm>
-                        <a:off x="1838076" y="1379828"/>
-                        <a:ext cx="914400" cy="771525"/>
+                        <a:off x="1939925" y="1498600"/>
+                        <a:ext cx="711200" cy="533400"/>
+                      </a:xfrm>
+                      <a:prstGeom prst="rect">
+                        <a:avLst/>
+                      </a:prstGeom>
+                    </p:spPr>
+                  </p:pic>
+                </p:oleObj>
+              </mc:Fallback>
+            </mc:AlternateContent>
+          </a:graphicData>
+        </a:graphic>
+      </p:graphicFrame>
+      <p:graphicFrame>
+        <p:nvGraphicFramePr>
+          <p:cNvPr id="5" name="Object 4">
+            <a:extLst>
+              <a:ext uri="{FF2B5EF4-FFF2-40B4-BE49-F238E27FC236}">
+                <a16:creationId xmlns:a16="http://schemas.microsoft.com/office/drawing/2014/main" id="{8B9C65B0-DAC2-49E1-9BA6-B6FB757E6440}"/>
+              </a:ext>
+            </a:extLst>
+          </p:cNvPr>
+          <p:cNvGraphicFramePr>
+            <a:graphicFrameLocks noChangeAspect="1"/>
+          </p:cNvGraphicFramePr>
+          <p:nvPr>
+            <p:extLst>
+              <p:ext uri="{D42A27DB-BD31-4B8C-83A1-F6EECF244321}">
+                <p14:modId xmlns:p14="http://schemas.microsoft.com/office/powerpoint/2010/main" val="4151080513"/>
+              </p:ext>
+            </p:extLst>
+          </p:nvPr>
+        </p:nvGraphicFramePr>
+        <p:xfrm>
+          <a:off x="2911475" y="1498600"/>
+          <a:ext cx="1265238" cy="533400"/>
+        </p:xfrm>
+        <a:graphic>
+          <a:graphicData uri="http://schemas.openxmlformats.org/presentationml/2006/ole">
+            <mc:AlternateContent xmlns:mc="http://schemas.openxmlformats.org/markup-compatibility/2006">
+              <mc:Choice xmlns:v="urn:schemas-microsoft-com:vml" Requires="v">
+                <p:oleObj spid="_x0000_s1037" name="Packager Shell Object" showAsIcon="1" r:id="rId6" imgW="1264680" imgH="532800" progId="Package">
+                  <p:embed/>
+                </p:oleObj>
+              </mc:Choice>
+              <mc:Fallback>
+                <p:oleObj name="Packager Shell Object" showAsIcon="1" r:id="rId6" imgW="1264680" imgH="532800" progId="Package">
+                  <p:embed/>
+                  <p:pic>
+                    <p:nvPicPr>
+                      <p:cNvPr id="0" name=""/>
+                      <p:cNvPicPr/>
+                      <p:nvPr/>
+                    </p:nvPicPr>
+                    <p:blipFill>
+                      <a:blip r:embed="rId7"/>
+                      <a:stretch>
+                        <a:fillRect/>
+                      </a:stretch>
+                    </p:blipFill>
+                    <p:spPr>
+                      <a:xfrm>
+                        <a:off x="2911475" y="1498600"/>
+                        <a:ext cx="1265238" cy="533400"/>
                       </a:xfrm>
                       <a:prstGeom prst="rect">
                         <a:avLst/>

</xml_diff>